<commit_message>
add feature generation file
</commit_message>
<xml_diff>
--- a/resources/ppts/第3次.pptx
+++ b/resources/ppts/第3次.pptx
@@ -224,7 +224,7 @@
           <a:p>
             <a:fld id="{1F745408-ED27-4CAF-B7C3-B7AF6EFD131E}" type="datetimeFigureOut">
               <a:rPr lang="zh-CN" altLang="en-US" smtClean="0"/>
-              <a:t>2019/11/24</a:t>
+              <a:t>2019/11/26</a:t>
             </a:fld>
             <a:endParaRPr lang="zh-CN" altLang="en-US"/>
           </a:p>
@@ -1543,7 +1543,145 @@
           <a:bodyPr/>
           <a:lstStyle/>
           <a:p>
-            <a:endParaRPr lang="zh-CN" altLang="en-US"/>
+            <a:r>
+              <a:rPr lang="en" altLang="zh-CN" sz="1200" kern="1200" dirty="0">
+                <a:solidFill>
+                  <a:schemeClr val="tx1"/>
+                </a:solidFill>
+                <a:effectLst/>
+                <a:latin typeface="+mn-lt"/>
+                <a:ea typeface="+mn-ea"/>
+                <a:cs typeface="+mn-cs"/>
+              </a:rPr>
+              <a:t>GBDT</a:t>
+            </a:r>
+            <a:r>
+              <a:rPr lang="zh-CN" altLang="en-US" sz="1200" kern="1200" dirty="0">
+                <a:solidFill>
+                  <a:schemeClr val="tx1"/>
+                </a:solidFill>
+                <a:effectLst/>
+                <a:latin typeface="+mn-lt"/>
+                <a:ea typeface="+mn-ea"/>
+                <a:cs typeface="+mn-cs"/>
+              </a:rPr>
+              <a:t>优点</a:t>
+            </a:r>
+            <a:r>
+              <a:rPr lang="en-US" altLang="zh-CN" sz="1200" kern="1200" dirty="0">
+                <a:solidFill>
+                  <a:schemeClr val="tx1"/>
+                </a:solidFill>
+                <a:effectLst/>
+                <a:latin typeface="+mn-lt"/>
+                <a:ea typeface="+mn-ea"/>
+                <a:cs typeface="+mn-cs"/>
+              </a:rPr>
+              <a:t>:1.</a:t>
+            </a:r>
+            <a:r>
+              <a:rPr lang="zh-CN" altLang="en-US" sz="1200" kern="1200" dirty="0">
+                <a:solidFill>
+                  <a:schemeClr val="tx1"/>
+                </a:solidFill>
+                <a:effectLst/>
+                <a:latin typeface="+mn-lt"/>
+                <a:ea typeface="+mn-ea"/>
+                <a:cs typeface="+mn-cs"/>
+              </a:rPr>
+              <a:t>可以灵活处理各类型数据</a:t>
+            </a:r>
+            <a:r>
+              <a:rPr lang="en-US" altLang="zh-CN" sz="1200" kern="1200" dirty="0">
+                <a:solidFill>
+                  <a:schemeClr val="tx1"/>
+                </a:solidFill>
+                <a:effectLst/>
+                <a:latin typeface="+mn-lt"/>
+                <a:ea typeface="+mn-ea"/>
+                <a:cs typeface="+mn-cs"/>
+              </a:rPr>
+              <a:t>(</a:t>
+            </a:r>
+            <a:r>
+              <a:rPr lang="zh-CN" altLang="en-US" sz="1200" kern="1200" dirty="0">
+                <a:solidFill>
+                  <a:schemeClr val="tx1"/>
+                </a:solidFill>
+                <a:effectLst/>
+                <a:latin typeface="+mn-lt"/>
+                <a:ea typeface="+mn-ea"/>
+                <a:cs typeface="+mn-cs"/>
+              </a:rPr>
+              <a:t>连续，离散</a:t>
+            </a:r>
+            <a:r>
+              <a:rPr lang="en-US" altLang="zh-CN" sz="1200" kern="1200" dirty="0">
+                <a:solidFill>
+                  <a:schemeClr val="tx1"/>
+                </a:solidFill>
+                <a:effectLst/>
+                <a:latin typeface="+mn-lt"/>
+                <a:ea typeface="+mn-ea"/>
+                <a:cs typeface="+mn-cs"/>
+              </a:rPr>
+              <a:t>)</a:t>
+            </a:r>
+          </a:p>
+          <a:p>
+            <a:r>
+              <a:rPr lang="en-US" altLang="zh-CN" sz="1200" kern="1200" dirty="0">
+                <a:solidFill>
+                  <a:schemeClr val="tx1"/>
+                </a:solidFill>
+                <a:effectLst/>
+                <a:latin typeface="+mn-lt"/>
+                <a:ea typeface="+mn-ea"/>
+                <a:cs typeface="+mn-cs"/>
+              </a:rPr>
+              <a:t>2.</a:t>
+            </a:r>
+            <a:r>
+              <a:rPr lang="zh-CN" altLang="en-US" sz="1200" kern="1200" dirty="0">
+                <a:solidFill>
+                  <a:schemeClr val="tx1"/>
+                </a:solidFill>
+                <a:effectLst/>
+                <a:latin typeface="+mn-lt"/>
+                <a:ea typeface="+mn-ea"/>
+                <a:cs typeface="+mn-cs"/>
+              </a:rPr>
+              <a:t>在分布稠密的数据集上，泛华能力和表达能力很好</a:t>
+            </a:r>
+          </a:p>
+          <a:p>
+            <a:r>
+              <a:rPr lang="en-US" altLang="zh-CN" sz="1200" kern="1200" dirty="0">
+                <a:solidFill>
+                  <a:schemeClr val="tx1"/>
+                </a:solidFill>
+                <a:effectLst/>
+                <a:latin typeface="+mn-lt"/>
+                <a:ea typeface="+mn-ea"/>
+                <a:cs typeface="+mn-cs"/>
+              </a:rPr>
+              <a:t>3.</a:t>
+            </a:r>
+            <a:r>
+              <a:rPr lang="zh-CN" altLang="en-US" sz="1200" kern="1200" dirty="0">
+                <a:solidFill>
+                  <a:schemeClr val="tx1"/>
+                </a:solidFill>
+                <a:effectLst/>
+                <a:latin typeface="+mn-lt"/>
+                <a:ea typeface="+mn-ea"/>
+                <a:cs typeface="+mn-cs"/>
+              </a:rPr>
+              <a:t>预测阶段速度快</a:t>
+            </a:r>
+          </a:p>
+          <a:p>
+            <a:endParaRPr lang="zh-CN" altLang="en-US" dirty="0"/>
           </a:p>
         </p:txBody>
       </p:sp>
@@ -12046,7 +12184,7 @@
         <p:spPr>
           <a:xfrm>
             <a:off x="877502" y="906550"/>
-            <a:ext cx="8589883" cy="1577035"/>
+            <a:ext cx="11314498" cy="1969385"/>
           </a:xfrm>
           <a:prstGeom prst="rect">
             <a:avLst/>
@@ -12068,7 +12206,7 @@
               </a:spcBef>
             </a:pPr>
             <a:r>
-              <a:rPr kumimoji="1" lang="zh-CN" altLang="en-US" sz="1200" b="1" kern="0" dirty="0">
+              <a:rPr kumimoji="1" lang="zh-CN" altLang="en-US" sz="1600" b="1" kern="0" dirty="0">
                 <a:latin typeface="微软雅黑" panose="020B0503020204020204" pitchFamily="34" charset="-122"/>
                 <a:ea typeface="微软雅黑" panose="020B0503020204020204" pitchFamily="34" charset="-122"/>
                 <a:cs typeface="+mn-ea"/>
@@ -12076,7 +12214,7 @@
               </a:rPr>
               <a:t>特征重要性</a:t>
             </a:r>
-            <a:endParaRPr kumimoji="1" lang="en-US" altLang="zh-CN" sz="1200" b="1" kern="0" dirty="0">
+            <a:endParaRPr kumimoji="1" lang="en-US" altLang="zh-CN" sz="1600" b="1" kern="0" dirty="0">
               <a:latin typeface="微软雅黑" panose="020B0503020204020204" pitchFamily="34" charset="-122"/>
               <a:ea typeface="微软雅黑" panose="020B0503020204020204" pitchFamily="34" charset="-122"/>
               <a:cs typeface="+mn-ea"/>
@@ -12095,7 +12233,7 @@
               <a:buChar char="•"/>
             </a:pPr>
             <a:r>
-              <a:rPr kumimoji="1" lang="en-US" altLang="zh-CN" sz="1200" kern="0" dirty="0">
+              <a:rPr kumimoji="1" lang="en-US" altLang="zh-CN" sz="1600" kern="0" dirty="0">
                 <a:latin typeface="微软雅黑" panose="020B0503020204020204" pitchFamily="34" charset="-122"/>
                 <a:ea typeface="微软雅黑" panose="020B0503020204020204" pitchFamily="34" charset="-122"/>
                 <a:cs typeface="+mn-ea"/>
@@ -12104,7 +12242,7 @@
               <a:t>Top</a:t>
             </a:r>
             <a:r>
-              <a:rPr kumimoji="1" lang="zh-CN" altLang="en-US" sz="1200" kern="0" dirty="0">
+              <a:rPr kumimoji="1" lang="zh-CN" altLang="en-US" sz="1600" kern="0" dirty="0">
                 <a:latin typeface="微软雅黑" panose="020B0503020204020204" pitchFamily="34" charset="-122"/>
                 <a:ea typeface="微软雅黑" panose="020B0503020204020204" pitchFamily="34" charset="-122"/>
                 <a:cs typeface="+mn-ea"/>
@@ -12113,7 +12251,7 @@
               <a:t> </a:t>
             </a:r>
             <a:r>
-              <a:rPr kumimoji="1" lang="en-US" altLang="zh-CN" sz="1200" kern="0" dirty="0">
+              <a:rPr kumimoji="1" lang="en-US" altLang="zh-CN" sz="1600" kern="0" dirty="0">
                 <a:latin typeface="微软雅黑" panose="020B0503020204020204" pitchFamily="34" charset="-122"/>
                 <a:ea typeface="微软雅黑" panose="020B0503020204020204" pitchFamily="34" charset="-122"/>
                 <a:cs typeface="+mn-ea"/>
@@ -12122,7 +12260,7 @@
               <a:t>10</a:t>
             </a:r>
             <a:r>
-              <a:rPr kumimoji="1" lang="zh-CN" altLang="en-US" sz="1200" kern="0" dirty="0">
+              <a:rPr kumimoji="1" lang="zh-CN" altLang="en-US" sz="1600" kern="0" dirty="0">
                 <a:latin typeface="微软雅黑" panose="020B0503020204020204" pitchFamily="34" charset="-122"/>
                 <a:ea typeface="微软雅黑" panose="020B0503020204020204" pitchFamily="34" charset="-122"/>
                 <a:cs typeface="+mn-ea"/>
@@ -12131,7 +12269,7 @@
               <a:t>编码特征中包含的原始特征有：</a:t>
             </a:r>
             <a:r>
-              <a:rPr kumimoji="1" lang="en-US" altLang="zh-CN" sz="1200" kern="0" dirty="0" err="1">
+              <a:rPr kumimoji="1" lang="en-US" altLang="zh-CN" sz="1600" kern="0" dirty="0" err="1">
                 <a:latin typeface="微软雅黑" panose="020B0503020204020204" pitchFamily="34" charset="-122"/>
                 <a:ea typeface="微软雅黑" panose="020B0503020204020204" pitchFamily="34" charset="-122"/>
                 <a:cs typeface="+mn-ea"/>
@@ -12140,7 +12278,7 @@
               <a:t>CreativeSize</a:t>
             </a:r>
             <a:r>
-              <a:rPr kumimoji="1" lang="en-US" altLang="zh-CN" sz="1200" kern="0" dirty="0">
+              <a:rPr kumimoji="1" lang="en-US" altLang="zh-CN" sz="1600" kern="0" dirty="0">
                 <a:latin typeface="微软雅黑" panose="020B0503020204020204" pitchFamily="34" charset="-122"/>
                 <a:ea typeface="微软雅黑" panose="020B0503020204020204" pitchFamily="34" charset="-122"/>
                 <a:cs typeface="+mn-ea"/>
@@ -12149,7 +12287,7 @@
               <a:t>, Age, </a:t>
             </a:r>
             <a:r>
-              <a:rPr kumimoji="1" lang="en-US" altLang="zh-CN" sz="1200" kern="0" dirty="0" err="1">
+              <a:rPr kumimoji="1" lang="en-US" altLang="zh-CN" sz="1600" kern="0" dirty="0" err="1">
                 <a:latin typeface="微软雅黑" panose="020B0503020204020204" pitchFamily="34" charset="-122"/>
                 <a:ea typeface="微软雅黑" panose="020B0503020204020204" pitchFamily="34" charset="-122"/>
                 <a:cs typeface="+mn-ea"/>
@@ -12158,7 +12296,7 @@
               <a:t>adCategoryId</a:t>
             </a:r>
             <a:r>
-              <a:rPr kumimoji="1" lang="en-US" altLang="zh-CN" sz="1200" kern="0" dirty="0">
+              <a:rPr kumimoji="1" lang="en-US" altLang="zh-CN" sz="1600" kern="0" dirty="0">
                 <a:latin typeface="微软雅黑" panose="020B0503020204020204" pitchFamily="34" charset="-122"/>
                 <a:ea typeface="微软雅黑" panose="020B0503020204020204" pitchFamily="34" charset="-122"/>
                 <a:cs typeface="+mn-ea"/>
@@ -12167,7 +12305,7 @@
               <a:t>, </a:t>
             </a:r>
             <a:r>
-              <a:rPr kumimoji="1" lang="en-US" altLang="zh-CN" sz="1200" kern="0" dirty="0" err="1">
+              <a:rPr kumimoji="1" lang="en-US" altLang="zh-CN" sz="1600" kern="0" dirty="0" err="1">
                 <a:latin typeface="微软雅黑" panose="020B0503020204020204" pitchFamily="34" charset="-122"/>
                 <a:ea typeface="微软雅黑" panose="020B0503020204020204" pitchFamily="34" charset="-122"/>
                 <a:cs typeface="+mn-ea"/>
@@ -12176,7 +12314,7 @@
               <a:t>productType,appIdAction</a:t>
             </a:r>
             <a:r>
-              <a:rPr kumimoji="1" lang="en-US" altLang="zh-CN" sz="1200" kern="0" dirty="0">
+              <a:rPr kumimoji="1" lang="en-US" altLang="zh-CN" sz="1600" kern="0" dirty="0">
                 <a:latin typeface="微软雅黑" panose="020B0503020204020204" pitchFamily="34" charset="-122"/>
                 <a:ea typeface="微软雅黑" panose="020B0503020204020204" pitchFamily="34" charset="-122"/>
                 <a:cs typeface="+mn-ea"/>
@@ -12197,7 +12335,7 @@
               <a:buChar char="•"/>
             </a:pPr>
             <a:r>
-              <a:rPr kumimoji="1" lang="zh-CN" altLang="en-US" sz="1200" kern="0" dirty="0">
+              <a:rPr kumimoji="1" lang="zh-CN" altLang="en-US" sz="1600" kern="0" dirty="0">
                 <a:latin typeface="微软雅黑" panose="020B0503020204020204" pitchFamily="34" charset="-122"/>
                 <a:ea typeface="微软雅黑" panose="020B0503020204020204" pitchFamily="34" charset="-122"/>
                 <a:cs typeface="+mn-ea"/>
@@ -12206,7 +12344,7 @@
               <a:t>采用</a:t>
             </a:r>
             <a:r>
-              <a:rPr kumimoji="1" lang="en-US" altLang="zh-CN" sz="1200" kern="0" dirty="0">
+              <a:rPr kumimoji="1" lang="en-US" altLang="zh-CN" sz="1600" kern="0" dirty="0">
                 <a:latin typeface="微软雅黑" panose="020B0503020204020204" pitchFamily="34" charset="-122"/>
                 <a:ea typeface="微软雅黑" panose="020B0503020204020204" pitchFamily="34" charset="-122"/>
                 <a:cs typeface="+mn-ea"/>
@@ -12215,7 +12353,7 @@
               <a:t>one-hot</a:t>
             </a:r>
             <a:r>
-              <a:rPr kumimoji="1" lang="zh-CN" altLang="en-US" sz="1200" kern="0" dirty="0">
+              <a:rPr kumimoji="1" lang="zh-CN" altLang="en-US" sz="1600" kern="0" dirty="0">
                 <a:latin typeface="微软雅黑" panose="020B0503020204020204" pitchFamily="34" charset="-122"/>
                 <a:ea typeface="微软雅黑" panose="020B0503020204020204" pitchFamily="34" charset="-122"/>
                 <a:cs typeface="+mn-ea"/>
@@ -12224,7 +12362,7 @@
               <a:t>编码的特征，特征向量过于稀疏，特征重要性较小；多取值特征如</a:t>
             </a:r>
             <a:r>
-              <a:rPr kumimoji="1" lang="en-US" altLang="zh-CN" sz="1200" kern="0" dirty="0">
+              <a:rPr kumimoji="1" lang="en-US" altLang="zh-CN" sz="1600" kern="0" dirty="0">
                 <a:latin typeface="微软雅黑" panose="020B0503020204020204" pitchFamily="34" charset="-122"/>
                 <a:ea typeface="微软雅黑" panose="020B0503020204020204" pitchFamily="34" charset="-122"/>
                 <a:cs typeface="+mn-ea"/>
@@ -12233,7 +12371,7 @@
               <a:t>interest</a:t>
             </a:r>
             <a:r>
-              <a:rPr kumimoji="1" lang="zh-CN" altLang="en-US" sz="1200" kern="0" dirty="0">
+              <a:rPr kumimoji="1" lang="zh-CN" altLang="en-US" sz="1600" kern="0" dirty="0">
                 <a:latin typeface="微软雅黑" panose="020B0503020204020204" pitchFamily="34" charset="-122"/>
                 <a:ea typeface="微软雅黑" panose="020B0503020204020204" pitchFamily="34" charset="-122"/>
                 <a:cs typeface="+mn-ea"/>
@@ -12242,7 +12380,7 @@
               <a:t>，</a:t>
             </a:r>
             <a:r>
-              <a:rPr kumimoji="1" lang="en-US" altLang="zh-CN" sz="1200" kern="0" dirty="0">
+              <a:rPr kumimoji="1" lang="en-US" altLang="zh-CN" sz="1600" kern="0" dirty="0">
                 <a:latin typeface="微软雅黑" panose="020B0503020204020204" pitchFamily="34" charset="-122"/>
                 <a:ea typeface="微软雅黑" panose="020B0503020204020204" pitchFamily="34" charset="-122"/>
                 <a:cs typeface="+mn-ea"/>
@@ -12251,7 +12389,7 @@
               <a:t>topic</a:t>
             </a:r>
             <a:r>
-              <a:rPr kumimoji="1" lang="zh-CN" altLang="en-US" sz="1200" kern="0" dirty="0">
+              <a:rPr kumimoji="1" lang="zh-CN" altLang="en-US" sz="1600" kern="0" dirty="0">
                 <a:latin typeface="微软雅黑" panose="020B0503020204020204" pitchFamily="34" charset="-122"/>
                 <a:ea typeface="微软雅黑" panose="020B0503020204020204" pitchFamily="34" charset="-122"/>
                 <a:cs typeface="+mn-ea"/>
@@ -12259,7 +12397,7 @@
               </a:rPr>
               <a:t>等的特征重要性较高</a:t>
             </a:r>
-            <a:endParaRPr kumimoji="1" lang="en-US" altLang="zh-CN" sz="1200" kern="0" dirty="0">
+            <a:endParaRPr kumimoji="1" lang="en-US" altLang="zh-CN" sz="1600" kern="0" dirty="0">
               <a:latin typeface="微软雅黑" panose="020B0503020204020204" pitchFamily="34" charset="-122"/>
               <a:ea typeface="微软雅黑" panose="020B0503020204020204" pitchFamily="34" charset="-122"/>
               <a:cs typeface="+mn-ea"/>
@@ -12275,7 +12413,7 @@
                 <a:spcPts val="600"/>
               </a:spcBef>
             </a:pPr>
-            <a:endParaRPr kumimoji="1" lang="en-US" altLang="zh-CN" sz="1200" b="1" kern="0" dirty="0">
+            <a:endParaRPr kumimoji="1" lang="en-US" altLang="zh-CN" sz="1600" b="1" kern="0" dirty="0">
               <a:latin typeface="微软雅黑" panose="020B0503020204020204" pitchFamily="34" charset="-122"/>
               <a:ea typeface="微软雅黑" panose="020B0503020204020204" pitchFamily="34" charset="-122"/>
               <a:cs typeface="+mn-ea"/>
@@ -12291,7 +12429,7 @@
                 <a:spcPts val="600"/>
               </a:spcBef>
             </a:pPr>
-            <a:endParaRPr kumimoji="1" lang="zh-CN" altLang="en-US" sz="1200" b="1" kern="0" dirty="0">
+            <a:endParaRPr kumimoji="1" lang="zh-CN" altLang="en-US" sz="1600" b="1" kern="0" dirty="0">
               <a:latin typeface="微软雅黑" panose="020B0503020204020204" pitchFamily="34" charset="-122"/>
               <a:ea typeface="微软雅黑" panose="020B0503020204020204" pitchFamily="34" charset="-122"/>
               <a:cs typeface="+mn-ea"/>
@@ -13195,7 +13333,7 @@
         <p:spPr>
           <a:xfrm>
             <a:off x="877503" y="983060"/>
-            <a:ext cx="7334168" cy="3796104"/>
+            <a:ext cx="7334168" cy="4116191"/>
           </a:xfrm>
           <a:prstGeom prst="rect">
             <a:avLst/>
@@ -13217,7 +13355,7 @@
               </a:spcBef>
             </a:pPr>
             <a:r>
-              <a:rPr kumimoji="1" lang="zh-CN" altLang="en-US" sz="1200" b="1" kern="0" dirty="0">
+              <a:rPr kumimoji="1" lang="zh-CN" altLang="en-US" sz="1600" b="1" kern="0" dirty="0">
                 <a:latin typeface="微软雅黑" panose="020B0503020204020204" pitchFamily="34" charset="-122"/>
                 <a:ea typeface="微软雅黑" panose="020B0503020204020204" pitchFamily="34" charset="-122"/>
                 <a:cs typeface="+mn-ea"/>
@@ -13225,7 +13363,7 @@
               </a:rPr>
               <a:t>参数调整</a:t>
             </a:r>
-            <a:endParaRPr kumimoji="1" lang="en-US" altLang="zh-CN" sz="1200" b="1" kern="0" dirty="0">
+            <a:endParaRPr kumimoji="1" lang="en-US" altLang="zh-CN" sz="1600" b="1" kern="0" dirty="0">
               <a:latin typeface="微软雅黑" panose="020B0503020204020204" pitchFamily="34" charset="-122"/>
               <a:ea typeface="微软雅黑" panose="020B0503020204020204" pitchFamily="34" charset="-122"/>
               <a:cs typeface="+mn-ea"/>
@@ -13244,7 +13382,7 @@
               <a:buChar char="•"/>
             </a:pPr>
             <a:r>
-              <a:rPr kumimoji="1" lang="zh-CN" altLang="en-US" sz="1200" kern="0" dirty="0">
+              <a:rPr kumimoji="1" lang="zh-CN" altLang="en-US" sz="1600" kern="0" dirty="0">
                 <a:latin typeface="微软雅黑" panose="020B0503020204020204" pitchFamily="34" charset="-122"/>
                 <a:ea typeface="微软雅黑" panose="020B0503020204020204" pitchFamily="34" charset="-122"/>
                 <a:cs typeface="+mn-ea"/>
@@ -13253,7 +13391,7 @@
               <a:t>主要调整的参数为：</a:t>
             </a:r>
             <a:r>
-              <a:rPr kumimoji="1" lang="en-US" altLang="zh-CN" sz="1200" kern="0" dirty="0" err="1">
+              <a:rPr kumimoji="1" lang="en-US" altLang="zh-CN" sz="1600" kern="0" dirty="0" err="1">
                 <a:latin typeface="微软雅黑" panose="020B0503020204020204" pitchFamily="34" charset="-122"/>
                 <a:ea typeface="微软雅黑" panose="020B0503020204020204" pitchFamily="34" charset="-122"/>
                 <a:cs typeface="+mn-ea"/>
@@ -13262,7 +13400,7 @@
               <a:t>max_depth</a:t>
             </a:r>
             <a:r>
-              <a:rPr kumimoji="1" lang="zh-CN" altLang="en-US" sz="1200" kern="0" dirty="0">
+              <a:rPr kumimoji="1" lang="zh-CN" altLang="en-US" sz="1600" kern="0" dirty="0">
                 <a:latin typeface="微软雅黑" panose="020B0503020204020204" pitchFamily="34" charset="-122"/>
                 <a:ea typeface="微软雅黑" panose="020B0503020204020204" pitchFamily="34" charset="-122"/>
                 <a:cs typeface="+mn-ea"/>
@@ -13271,7 +13409,7 @@
               <a:t>和</a:t>
             </a:r>
             <a:r>
-              <a:rPr kumimoji="1" lang="en-US" altLang="zh-CN" sz="1200" kern="0" dirty="0" err="1">
+              <a:rPr kumimoji="1" lang="en-US" altLang="zh-CN" sz="1600" kern="0" dirty="0" err="1">
                 <a:latin typeface="微软雅黑" panose="020B0503020204020204" pitchFamily="34" charset="-122"/>
                 <a:ea typeface="微软雅黑" panose="020B0503020204020204" pitchFamily="34" charset="-122"/>
                 <a:cs typeface="+mn-ea"/>
@@ -13280,7 +13418,7 @@
               <a:t>num_leaves</a:t>
             </a:r>
             <a:r>
-              <a:rPr kumimoji="1" lang="zh-CN" altLang="en-US" sz="1200" kern="0" dirty="0">
+              <a:rPr kumimoji="1" lang="zh-CN" altLang="en-US" sz="1600" kern="0" dirty="0">
                 <a:latin typeface="微软雅黑" panose="020B0503020204020204" pitchFamily="34" charset="-122"/>
                 <a:ea typeface="微软雅黑" panose="020B0503020204020204" pitchFamily="34" charset="-122"/>
                 <a:cs typeface="+mn-ea"/>
@@ -13288,7 +13426,7 @@
               </a:rPr>
               <a:t>，</a:t>
             </a:r>
-            <a:endParaRPr kumimoji="1" lang="en-US" altLang="zh-CN" sz="1200" kern="0" dirty="0">
+            <a:endParaRPr kumimoji="1" lang="en-US" altLang="zh-CN" sz="1600" kern="0" dirty="0">
               <a:latin typeface="微软雅黑" panose="020B0503020204020204" pitchFamily="34" charset="-122"/>
               <a:ea typeface="微软雅黑" panose="020B0503020204020204" pitchFamily="34" charset="-122"/>
               <a:cs typeface="+mn-ea"/>
@@ -13307,7 +13445,7 @@
               <a:buChar char="•"/>
             </a:pPr>
             <a:r>
-              <a:rPr kumimoji="1" lang="en-US" altLang="zh-CN" sz="1200" kern="0" dirty="0" err="1">
+              <a:rPr kumimoji="1" lang="en-US" altLang="zh-CN" sz="1600" kern="0" dirty="0" err="1">
                 <a:latin typeface="微软雅黑" panose="020B0503020204020204" pitchFamily="34" charset="-122"/>
                 <a:ea typeface="微软雅黑" panose="020B0503020204020204" pitchFamily="34" charset="-122"/>
                 <a:cs typeface="+mn-ea"/>
@@ -13316,7 +13454,7 @@
               <a:t>max_depth</a:t>
             </a:r>
             <a:r>
-              <a:rPr kumimoji="1" lang="en-US" altLang="zh-CN" sz="1200" kern="0" dirty="0">
+              <a:rPr kumimoji="1" lang="en-US" altLang="zh-CN" sz="1600" kern="0" dirty="0">
                 <a:latin typeface="微软雅黑" panose="020B0503020204020204" pitchFamily="34" charset="-122"/>
                 <a:ea typeface="微软雅黑" panose="020B0503020204020204" pitchFamily="34" charset="-122"/>
                 <a:cs typeface="+mn-ea"/>
@@ -13325,7 +13463,7 @@
               <a:t>——</a:t>
             </a:r>
             <a:r>
-              <a:rPr kumimoji="1" lang="zh-CN" altLang="en-US" sz="1200" kern="0" dirty="0">
+              <a:rPr kumimoji="1" lang="zh-CN" altLang="en-US" sz="1600" kern="0" dirty="0">
                 <a:latin typeface="微软雅黑" panose="020B0503020204020204" pitchFamily="34" charset="-122"/>
                 <a:ea typeface="微软雅黑" panose="020B0503020204020204" pitchFamily="34" charset="-122"/>
                 <a:cs typeface="+mn-ea"/>
@@ -13334,7 +13472,7 @@
               <a:t>决策树的深度；</a:t>
             </a:r>
             <a:r>
-              <a:rPr kumimoji="1" lang="en-US" altLang="zh-CN" sz="1200" kern="0" dirty="0">
+              <a:rPr kumimoji="1" lang="en-US" altLang="zh-CN" sz="1600" kern="0" dirty="0">
                 <a:latin typeface="微软雅黑" panose="020B0503020204020204" pitchFamily="34" charset="-122"/>
                 <a:ea typeface="微软雅黑" panose="020B0503020204020204" pitchFamily="34" charset="-122"/>
                 <a:cs typeface="+mn-ea"/>
@@ -13343,7 +13481,7 @@
               <a:t> </a:t>
             </a:r>
             <a:r>
-              <a:rPr kumimoji="1" lang="en-US" altLang="zh-CN" sz="1200" kern="0" dirty="0" err="1">
+              <a:rPr kumimoji="1" lang="en-US" altLang="zh-CN" sz="1600" kern="0" dirty="0" err="1">
                 <a:latin typeface="微软雅黑" panose="020B0503020204020204" pitchFamily="34" charset="-122"/>
                 <a:ea typeface="微软雅黑" panose="020B0503020204020204" pitchFamily="34" charset="-122"/>
                 <a:cs typeface="+mn-ea"/>
@@ -13352,7 +13490,7 @@
               <a:t>num_leaves</a:t>
             </a:r>
             <a:r>
-              <a:rPr kumimoji="1" lang="en-US" altLang="zh-CN" sz="1200" kern="0" dirty="0">
+              <a:rPr kumimoji="1" lang="en-US" altLang="zh-CN" sz="1600" kern="0" dirty="0">
                 <a:latin typeface="微软雅黑" panose="020B0503020204020204" pitchFamily="34" charset="-122"/>
                 <a:ea typeface="微软雅黑" panose="020B0503020204020204" pitchFamily="34" charset="-122"/>
                 <a:cs typeface="+mn-ea"/>
@@ -13361,7 +13499,7 @@
               <a:t>——</a:t>
             </a:r>
             <a:r>
-              <a:rPr kumimoji="1" lang="zh-CN" altLang="en-US" sz="1200" kern="0" dirty="0">
+              <a:rPr kumimoji="1" lang="zh-CN" altLang="en-US" sz="1600" kern="0" dirty="0">
                 <a:latin typeface="微软雅黑" panose="020B0503020204020204" pitchFamily="34" charset="-122"/>
                 <a:ea typeface="微软雅黑" panose="020B0503020204020204" pitchFamily="34" charset="-122"/>
                 <a:cs typeface="+mn-ea"/>
@@ -13369,7 +13507,7 @@
               </a:rPr>
               <a:t>决策树叶子结点数目</a:t>
             </a:r>
-            <a:endParaRPr kumimoji="1" lang="en-US" altLang="zh-CN" sz="1200" kern="0" dirty="0">
+            <a:endParaRPr kumimoji="1" lang="en-US" altLang="zh-CN" sz="1600" kern="0" dirty="0">
               <a:latin typeface="微软雅黑" panose="020B0503020204020204" pitchFamily="34" charset="-122"/>
               <a:ea typeface="微软雅黑" panose="020B0503020204020204" pitchFamily="34" charset="-122"/>
               <a:cs typeface="+mn-ea"/>
@@ -13388,10 +13526,10 @@
               <a:buChar char="•"/>
             </a:pPr>
             <a:r>
-              <a:rPr lang="zh-CN" altLang="en-US" sz="1200" dirty="0"/>
+              <a:rPr lang="zh-CN" altLang="en-US" sz="1600" dirty="0"/>
               <a:t>提高精确度的最重要的参数</a:t>
             </a:r>
-            <a:endParaRPr kumimoji="1" lang="en-US" altLang="zh-CN" sz="1200" kern="0" dirty="0">
+            <a:endParaRPr kumimoji="1" lang="en-US" altLang="zh-CN" sz="1600" kern="0" dirty="0">
               <a:latin typeface="微软雅黑" panose="020B0503020204020204" pitchFamily="34" charset="-122"/>
               <a:ea typeface="微软雅黑" panose="020B0503020204020204" pitchFamily="34" charset="-122"/>
               <a:cs typeface="+mn-ea"/>
@@ -13543,13 +13681,13 @@
           <p:nvPr>
             <p:extLst>
               <p:ext uri="{D42A27DB-BD31-4B8C-83A1-F6EECF244321}">
-                <p14:modId xmlns:p14="http://schemas.microsoft.com/office/powerpoint/2010/main" val="3744197331"/>
+                <p14:modId xmlns:p14="http://schemas.microsoft.com/office/powerpoint/2010/main" val="1044336675"/>
               </p:ext>
             </p:extLst>
           </p:nvPr>
         </p:nvGraphicFramePr>
         <p:xfrm>
-          <a:off x="1093359" y="2407783"/>
+          <a:off x="1093359" y="2702747"/>
           <a:ext cx="4915842" cy="2608207"/>
         </p:xfrm>
         <a:graphic>
@@ -13979,7 +14117,7 @@
         </p:nvSpPr>
         <p:spPr>
           <a:xfrm>
-            <a:off x="1993802" y="5015990"/>
+            <a:off x="1993802" y="5310954"/>
             <a:ext cx="3268844" cy="308995"/>
           </a:xfrm>
           <a:prstGeom prst="rect">
@@ -14082,13 +14220,13 @@
           <p:nvPr>
             <p:extLst>
               <p:ext uri="{D42A27DB-BD31-4B8C-83A1-F6EECF244321}">
-                <p14:modId xmlns:p14="http://schemas.microsoft.com/office/powerpoint/2010/main" val="875978262"/>
+                <p14:modId xmlns:p14="http://schemas.microsoft.com/office/powerpoint/2010/main" val="3776641237"/>
               </p:ext>
             </p:extLst>
           </p:nvPr>
         </p:nvGraphicFramePr>
         <p:xfrm>
-          <a:off x="6733935" y="2407783"/>
+          <a:off x="6733935" y="2702747"/>
           <a:ext cx="4915842" cy="2608207"/>
         </p:xfrm>
         <a:graphic>
@@ -14534,7 +14672,7 @@
         </p:nvSpPr>
         <p:spPr>
           <a:xfrm>
-            <a:off x="7358282" y="5015990"/>
+            <a:off x="7358282" y="5310954"/>
             <a:ext cx="3576620" cy="308995"/>
           </a:xfrm>
           <a:prstGeom prst="rect">
@@ -14724,7 +14862,7 @@
         <p:spPr>
           <a:xfrm>
             <a:off x="877503" y="983060"/>
-            <a:ext cx="7334168" cy="4036170"/>
+            <a:ext cx="7334168" cy="4756367"/>
           </a:xfrm>
           <a:prstGeom prst="rect">
             <a:avLst/>
@@ -14746,7 +14884,7 @@
               </a:spcBef>
             </a:pPr>
             <a:r>
-              <a:rPr kumimoji="1" lang="zh-CN" altLang="en-US" sz="1200" b="1" kern="0" dirty="0">
+              <a:rPr kumimoji="1" lang="zh-CN" altLang="en-US" sz="1600" b="1" kern="0" dirty="0">
                 <a:latin typeface="微软雅黑" panose="020B0503020204020204" pitchFamily="34" charset="-122"/>
                 <a:ea typeface="微软雅黑" panose="020B0503020204020204" pitchFamily="34" charset="-122"/>
                 <a:cs typeface="+mn-ea"/>
@@ -14754,7 +14892,7 @@
               </a:rPr>
               <a:t>模型优点</a:t>
             </a:r>
-            <a:endParaRPr kumimoji="1" lang="en-US" altLang="zh-CN" sz="1200" b="1" kern="0" dirty="0">
+            <a:endParaRPr kumimoji="1" lang="en-US" altLang="zh-CN" sz="1600" b="1" kern="0" dirty="0">
               <a:latin typeface="微软雅黑" panose="020B0503020204020204" pitchFamily="34" charset="-122"/>
               <a:ea typeface="微软雅黑" panose="020B0503020204020204" pitchFamily="34" charset="-122"/>
               <a:cs typeface="+mn-ea"/>
@@ -14773,7 +14911,7 @@
               <a:buChar char="•"/>
             </a:pPr>
             <a:r>
-              <a:rPr kumimoji="1" lang="zh-CN" altLang="en-US" sz="1200" kern="0" dirty="0">
+              <a:rPr kumimoji="1" lang="zh-CN" altLang="en-US" sz="1600" kern="0" dirty="0">
                 <a:latin typeface="微软雅黑" panose="020B0503020204020204" pitchFamily="34" charset="-122"/>
                 <a:ea typeface="微软雅黑" panose="020B0503020204020204" pitchFamily="34" charset="-122"/>
                 <a:cs typeface="+mn-ea"/>
@@ -14781,7 +14919,7 @@
               </a:rPr>
               <a:t>直接利用原始特征，模型构建简单、方便</a:t>
             </a:r>
-            <a:endParaRPr kumimoji="1" lang="en-US" altLang="zh-CN" sz="1200" kern="0" dirty="0">
+            <a:endParaRPr kumimoji="1" lang="en-US" altLang="zh-CN" sz="1600" kern="0" dirty="0">
               <a:latin typeface="微软雅黑" panose="020B0503020204020204" pitchFamily="34" charset="-122"/>
               <a:ea typeface="微软雅黑" panose="020B0503020204020204" pitchFamily="34" charset="-122"/>
               <a:cs typeface="+mn-ea"/>
@@ -14800,7 +14938,7 @@
               <a:buChar char="•"/>
             </a:pPr>
             <a:r>
-              <a:rPr kumimoji="1" lang="zh-CN" altLang="en-US" sz="1200" kern="0" dirty="0">
+              <a:rPr kumimoji="1" lang="zh-CN" altLang="en-US" sz="1600" kern="0" dirty="0">
                 <a:latin typeface="微软雅黑" panose="020B0503020204020204" pitchFamily="34" charset="-122"/>
                 <a:ea typeface="微软雅黑" panose="020B0503020204020204" pitchFamily="34" charset="-122"/>
                 <a:cs typeface="+mn-ea"/>
@@ -14809,7 +14947,7 @@
               <a:t>取得的结果较为理想（</a:t>
             </a:r>
             <a:r>
-              <a:rPr kumimoji="1" lang="en-US" altLang="zh-CN" sz="1200" kern="0" dirty="0">
+              <a:rPr kumimoji="1" lang="en-US" altLang="zh-CN" sz="1600" kern="0" dirty="0">
                 <a:latin typeface="微软雅黑" panose="020B0503020204020204" pitchFamily="34" charset="-122"/>
                 <a:ea typeface="微软雅黑" panose="020B0503020204020204" pitchFamily="34" charset="-122"/>
                 <a:cs typeface="+mn-ea"/>
@@ -14818,7 +14956,7 @@
               <a:t>0.73</a:t>
             </a:r>
             <a:r>
-              <a:rPr kumimoji="1" lang="zh-CN" altLang="en-US" sz="1200" kern="0" dirty="0">
+              <a:rPr kumimoji="1" lang="zh-CN" altLang="en-US" sz="1600" kern="0" dirty="0">
                 <a:latin typeface="微软雅黑" panose="020B0503020204020204" pitchFamily="34" charset="-122"/>
                 <a:ea typeface="微软雅黑" panose="020B0503020204020204" pitchFamily="34" charset="-122"/>
                 <a:cs typeface="+mn-ea"/>
@@ -14827,7 +14965,7 @@
               <a:t>），与 </a:t>
             </a:r>
             <a:r>
-              <a:rPr kumimoji="1" lang="en-US" altLang="zh-CN" sz="1200" kern="0" dirty="0">
+              <a:rPr kumimoji="1" lang="en-US" altLang="zh-CN" sz="1600" kern="0" dirty="0">
                 <a:latin typeface="微软雅黑" panose="020B0503020204020204" pitchFamily="34" charset="-122"/>
                 <a:ea typeface="微软雅黑" panose="020B0503020204020204" pitchFamily="34" charset="-122"/>
                 <a:cs typeface="+mn-ea"/>
@@ -14836,7 +14974,7 @@
               <a:t>top</a:t>
             </a:r>
             <a:r>
-              <a:rPr kumimoji="1" lang="zh-CN" altLang="en-US" sz="1200" kern="0" dirty="0">
+              <a:rPr kumimoji="1" lang="zh-CN" altLang="en-US" sz="1600" kern="0" dirty="0">
                 <a:latin typeface="微软雅黑" panose="020B0503020204020204" pitchFamily="34" charset="-122"/>
                 <a:ea typeface="微软雅黑" panose="020B0503020204020204" pitchFamily="34" charset="-122"/>
                 <a:cs typeface="+mn-ea"/>
@@ -14845,7 +14983,7 @@
               <a:t> </a:t>
             </a:r>
             <a:r>
-              <a:rPr kumimoji="1" lang="en-US" altLang="zh-CN" sz="1200" kern="0" dirty="0">
+              <a:rPr kumimoji="1" lang="en-US" altLang="zh-CN" sz="1600" kern="0" dirty="0">
                 <a:latin typeface="微软雅黑" panose="020B0503020204020204" pitchFamily="34" charset="-122"/>
                 <a:ea typeface="微软雅黑" panose="020B0503020204020204" pitchFamily="34" charset="-122"/>
                 <a:cs typeface="+mn-ea"/>
@@ -14854,7 +14992,7 @@
               <a:t>10</a:t>
             </a:r>
             <a:r>
-              <a:rPr kumimoji="1" lang="zh-CN" altLang="en-US" sz="1200" kern="0" dirty="0">
+              <a:rPr kumimoji="1" lang="zh-CN" altLang="en-US" sz="1600" kern="0" dirty="0">
                 <a:latin typeface="微软雅黑" panose="020B0503020204020204" pitchFamily="34" charset="-122"/>
                 <a:ea typeface="微软雅黑" panose="020B0503020204020204" pitchFamily="34" charset="-122"/>
                 <a:cs typeface="+mn-ea"/>
@@ -14863,7 +15001,7 @@
               <a:t> 结果（</a:t>
             </a:r>
             <a:r>
-              <a:rPr kumimoji="1" lang="en-US" altLang="zh-CN" sz="1200" kern="0" dirty="0">
+              <a:rPr kumimoji="1" lang="en-US" altLang="zh-CN" sz="1600" kern="0" dirty="0">
                 <a:latin typeface="微软雅黑" panose="020B0503020204020204" pitchFamily="34" charset="-122"/>
                 <a:ea typeface="微软雅黑" panose="020B0503020204020204" pitchFamily="34" charset="-122"/>
                 <a:cs typeface="+mn-ea"/>
@@ -14872,7 +15010,7 @@
               <a:t>0.77+</a:t>
             </a:r>
             <a:r>
-              <a:rPr kumimoji="1" lang="zh-CN" altLang="en-US" sz="1200" kern="0" dirty="0">
+              <a:rPr kumimoji="1" lang="zh-CN" altLang="en-US" sz="1600" kern="0" dirty="0">
                 <a:latin typeface="微软雅黑" panose="020B0503020204020204" pitchFamily="34" charset="-122"/>
                 <a:ea typeface="微软雅黑" panose="020B0503020204020204" pitchFamily="34" charset="-122"/>
                 <a:cs typeface="+mn-ea"/>
@@ -14880,7 +15018,7 @@
               </a:rPr>
               <a:t>）较为接近</a:t>
             </a:r>
-            <a:endParaRPr kumimoji="1" lang="en-US" altLang="zh-CN" sz="1200" kern="0" dirty="0">
+            <a:endParaRPr kumimoji="1" lang="en-US" altLang="zh-CN" sz="1600" kern="0" dirty="0">
               <a:latin typeface="微软雅黑" panose="020B0503020204020204" pitchFamily="34" charset="-122"/>
               <a:ea typeface="微软雅黑" panose="020B0503020204020204" pitchFamily="34" charset="-122"/>
               <a:cs typeface="+mn-ea"/>
@@ -14896,7 +15034,7 @@
                 <a:spcPts val="600"/>
               </a:spcBef>
             </a:pPr>
-            <a:endParaRPr kumimoji="1" lang="en-US" altLang="zh-CN" sz="1200" b="1" kern="0" dirty="0">
+            <a:endParaRPr kumimoji="1" lang="en-US" altLang="zh-CN" sz="1600" b="1" kern="0" dirty="0">
               <a:latin typeface="微软雅黑" panose="020B0503020204020204" pitchFamily="34" charset="-122"/>
               <a:ea typeface="微软雅黑" panose="020B0503020204020204" pitchFamily="34" charset="-122"/>
               <a:cs typeface="+mn-ea"/>
@@ -14913,7 +15051,7 @@
               </a:spcBef>
             </a:pPr>
             <a:r>
-              <a:rPr kumimoji="1" lang="zh-CN" altLang="en-US" sz="1200" b="1" kern="0" dirty="0">
+              <a:rPr kumimoji="1" lang="zh-CN" altLang="en-US" sz="1600" b="1" kern="0" dirty="0">
                 <a:latin typeface="微软雅黑" panose="020B0503020204020204" pitchFamily="34" charset="-122"/>
                 <a:ea typeface="微软雅黑" panose="020B0503020204020204" pitchFamily="34" charset="-122"/>
                 <a:cs typeface="+mn-ea"/>
@@ -14921,7 +15059,7 @@
               </a:rPr>
               <a:t>模型缺点</a:t>
             </a:r>
-            <a:endParaRPr kumimoji="1" lang="en-US" altLang="zh-CN" sz="1200" b="1" kern="0" dirty="0">
+            <a:endParaRPr kumimoji="1" lang="en-US" altLang="zh-CN" sz="1600" b="1" kern="0" dirty="0">
               <a:latin typeface="微软雅黑" panose="020B0503020204020204" pitchFamily="34" charset="-122"/>
               <a:ea typeface="微软雅黑" panose="020B0503020204020204" pitchFamily="34" charset="-122"/>
               <a:cs typeface="+mn-ea"/>
@@ -14940,7 +15078,7 @@
               <a:buChar char="•"/>
             </a:pPr>
             <a:r>
-              <a:rPr kumimoji="1" lang="en-US" altLang="zh-CN" sz="1200" kern="0" dirty="0">
+              <a:rPr kumimoji="1" lang="en-US" altLang="zh-CN" sz="1600" kern="0" dirty="0">
                 <a:latin typeface="微软雅黑" panose="020B0503020204020204" pitchFamily="34" charset="-122"/>
                 <a:ea typeface="微软雅黑" panose="020B0503020204020204" pitchFamily="34" charset="-122"/>
                 <a:cs typeface="+mn-ea"/>
@@ -14949,7 +15087,7 @@
               <a:t>One-hot</a:t>
             </a:r>
             <a:r>
-              <a:rPr kumimoji="1" lang="zh-CN" altLang="en-US" sz="1200" kern="0" dirty="0">
+              <a:rPr kumimoji="1" lang="zh-CN" altLang="en-US" sz="1600" kern="0" dirty="0">
                 <a:latin typeface="微软雅黑" panose="020B0503020204020204" pitchFamily="34" charset="-122"/>
                 <a:ea typeface="微软雅黑" panose="020B0503020204020204" pitchFamily="34" charset="-122"/>
                 <a:cs typeface="+mn-ea"/>
@@ -14957,7 +15095,7 @@
               </a:rPr>
               <a:t>特征编码维度太高，导致模型时间和空间效率低</a:t>
             </a:r>
-            <a:endParaRPr kumimoji="1" lang="en-US" altLang="zh-CN" sz="1200" kern="0" dirty="0">
+            <a:endParaRPr kumimoji="1" lang="en-US" altLang="zh-CN" sz="1600" kern="0" dirty="0">
               <a:latin typeface="微软雅黑" panose="020B0503020204020204" pitchFamily="34" charset="-122"/>
               <a:ea typeface="微软雅黑" panose="020B0503020204020204" pitchFamily="34" charset="-122"/>
               <a:cs typeface="+mn-ea"/>
@@ -14976,7 +15114,7 @@
               <a:buChar char="•"/>
             </a:pPr>
             <a:r>
-              <a:rPr kumimoji="1" lang="en-US" altLang="zh-CN" sz="1200" kern="0" dirty="0">
+              <a:rPr kumimoji="1" lang="en-US" altLang="zh-CN" sz="1600" kern="0" dirty="0">
                 <a:latin typeface="微软雅黑" panose="020B0503020204020204" pitchFamily="34" charset="-122"/>
                 <a:ea typeface="微软雅黑" panose="020B0503020204020204" pitchFamily="34" charset="-122"/>
                 <a:cs typeface="+mn-ea"/>
@@ -14985,7 +15123,7 @@
               <a:t>One-hot</a:t>
             </a:r>
             <a:r>
-              <a:rPr kumimoji="1" lang="zh-CN" altLang="en-US" sz="1200" kern="0" dirty="0">
+              <a:rPr kumimoji="1" lang="zh-CN" altLang="en-US" sz="1600" kern="0" dirty="0">
                 <a:latin typeface="微软雅黑" panose="020B0503020204020204" pitchFamily="34" charset="-122"/>
                 <a:ea typeface="微软雅黑" panose="020B0503020204020204" pitchFamily="34" charset="-122"/>
                 <a:cs typeface="+mn-ea"/>
@@ -14993,7 +15131,7 @@
               </a:rPr>
               <a:t>特征编码过于稀疏，无法准确地提取数据特征</a:t>
             </a:r>
-            <a:endParaRPr kumimoji="1" lang="en-US" altLang="zh-CN" sz="1200" kern="0" dirty="0">
+            <a:endParaRPr kumimoji="1" lang="en-US" altLang="zh-CN" sz="1600" kern="0" dirty="0">
               <a:latin typeface="微软雅黑" panose="020B0503020204020204" pitchFamily="34" charset="-122"/>
               <a:ea typeface="微软雅黑" panose="020B0503020204020204" pitchFamily="34" charset="-122"/>
               <a:cs typeface="+mn-ea"/>
@@ -15012,7 +15150,7 @@
               <a:buChar char="•"/>
             </a:pPr>
             <a:r>
-              <a:rPr kumimoji="1" lang="zh-CN" altLang="en-US" sz="1200" kern="0" dirty="0">
+              <a:rPr kumimoji="1" lang="zh-CN" altLang="en-US" sz="1600" kern="0" dirty="0">
                 <a:latin typeface="微软雅黑" panose="020B0503020204020204" pitchFamily="34" charset="-122"/>
                 <a:ea typeface="微软雅黑" panose="020B0503020204020204" pitchFamily="34" charset="-122"/>
                 <a:cs typeface="+mn-ea"/>
@@ -15020,7 +15158,7 @@
               </a:rPr>
               <a:t>直接利用原始数据特征作为模型特征输入，而未经过特征工程处理，没有考虑特征之间的关联以及不同特对分类不同方面的影响</a:t>
             </a:r>
-            <a:endParaRPr kumimoji="1" lang="en-US" altLang="zh-CN" sz="1200" kern="0" dirty="0">
+            <a:endParaRPr kumimoji="1" lang="en-US" altLang="zh-CN" sz="1600" kern="0" dirty="0">
               <a:latin typeface="微软雅黑" panose="020B0503020204020204" pitchFamily="34" charset="-122"/>
               <a:ea typeface="微软雅黑" panose="020B0503020204020204" pitchFamily="34" charset="-122"/>
               <a:cs typeface="+mn-ea"/>
@@ -16640,7 +16778,7 @@
         <p:spPr>
           <a:xfrm>
             <a:off x="877503" y="959881"/>
-            <a:ext cx="6821098" cy="2845074"/>
+            <a:ext cx="8821646" cy="3557449"/>
           </a:xfrm>
           <a:prstGeom prst="rect">
             <a:avLst/>
@@ -16662,7 +16800,7 @@
               </a:spcBef>
             </a:pPr>
             <a:r>
-              <a:rPr kumimoji="1" lang="zh-CN" altLang="en-US" sz="1200" b="1" kern="0" dirty="0">
+              <a:rPr kumimoji="1" lang="zh-CN" altLang="en-US" sz="1600" b="1" kern="0" dirty="0">
                 <a:latin typeface="微软雅黑" panose="020B0503020204020204" pitchFamily="34" charset="-122"/>
                 <a:ea typeface="微软雅黑" panose="020B0503020204020204" pitchFamily="34" charset="-122"/>
                 <a:cs typeface="+mn-ea"/>
@@ -16670,7 +16808,7 @@
               </a:rPr>
               <a:t>特征构建</a:t>
             </a:r>
-            <a:endParaRPr kumimoji="1" lang="en-US" altLang="zh-CN" sz="1200" b="1" kern="0" dirty="0">
+            <a:endParaRPr kumimoji="1" lang="en-US" altLang="zh-CN" sz="1600" b="1" kern="0" dirty="0">
               <a:latin typeface="微软雅黑" panose="020B0503020204020204" pitchFamily="34" charset="-122"/>
               <a:ea typeface="微软雅黑" panose="020B0503020204020204" pitchFamily="34" charset="-122"/>
               <a:cs typeface="+mn-ea"/>
@@ -16689,7 +16827,7 @@
               <a:buChar char="•"/>
             </a:pPr>
             <a:r>
-              <a:rPr kumimoji="1" lang="zh-CN" altLang="en-US" sz="1200" kern="0" dirty="0">
+              <a:rPr kumimoji="1" lang="zh-CN" altLang="en-US" sz="1600" kern="0" dirty="0">
                 <a:latin typeface="微软雅黑" panose="020B0503020204020204" pitchFamily="34" charset="-122"/>
                 <a:ea typeface="微软雅黑" panose="020B0503020204020204" pitchFamily="34" charset="-122"/>
                 <a:cs typeface="+mn-ea"/>
@@ -16697,7 +16835,7 @@
               </a:rPr>
               <a:t>多值长度特征：基于多个取值的离散特征，取值越多可能代表用户感兴趣的广告更为广泛</a:t>
             </a:r>
-            <a:endParaRPr kumimoji="1" lang="en-US" altLang="zh-CN" sz="1200" kern="0" dirty="0">
+            <a:endParaRPr kumimoji="1" lang="en-US" altLang="zh-CN" sz="1600" kern="0" dirty="0">
               <a:latin typeface="微软雅黑" panose="020B0503020204020204" pitchFamily="34" charset="-122"/>
               <a:ea typeface="微软雅黑" panose="020B0503020204020204" pitchFamily="34" charset="-122"/>
               <a:cs typeface="+mn-ea"/>
@@ -16716,7 +16854,7 @@
               <a:buChar char="•"/>
             </a:pPr>
             <a:r>
-              <a:rPr kumimoji="1" lang="zh-CN" altLang="en-US" sz="1200" kern="0" dirty="0">
+              <a:rPr kumimoji="1" lang="zh-CN" altLang="en-US" sz="1600" kern="0" dirty="0">
                 <a:latin typeface="微软雅黑" panose="020B0503020204020204" pitchFamily="34" charset="-122"/>
                 <a:ea typeface="微软雅黑" panose="020B0503020204020204" pitchFamily="34" charset="-122"/>
                 <a:cs typeface="+mn-ea"/>
@@ -16724,7 +16862,7 @@
               </a:rPr>
               <a:t>转化率特征：统计每个原始特征取值上对广告感兴趣的用户比例</a:t>
             </a:r>
-            <a:endParaRPr kumimoji="1" lang="en-US" altLang="zh-CN" sz="1200" kern="0" dirty="0">
+            <a:endParaRPr kumimoji="1" lang="en-US" altLang="zh-CN" sz="1600" kern="0" dirty="0">
               <a:latin typeface="微软雅黑" panose="020B0503020204020204" pitchFamily="34" charset="-122"/>
               <a:ea typeface="微软雅黑" panose="020B0503020204020204" pitchFamily="34" charset="-122"/>
               <a:cs typeface="+mn-ea"/>
@@ -16743,7 +16881,7 @@
               <a:buChar char="•"/>
             </a:pPr>
             <a:r>
-              <a:rPr kumimoji="1" lang="zh-CN" altLang="en-US" sz="1200" kern="0" dirty="0">
+              <a:rPr kumimoji="1" lang="zh-CN" altLang="en-US" sz="1600" kern="0" dirty="0">
                 <a:latin typeface="微软雅黑" panose="020B0503020204020204" pitchFamily="34" charset="-122"/>
                 <a:ea typeface="微软雅黑" panose="020B0503020204020204" pitchFamily="34" charset="-122"/>
                 <a:cs typeface="+mn-ea"/>
@@ -16751,7 +16889,7 @@
               </a:rPr>
               <a:t>投放量特征：统计每个原始特征取值的分布概率</a:t>
             </a:r>
-            <a:endParaRPr kumimoji="1" lang="en-US" altLang="zh-CN" sz="1200" kern="0" dirty="0">
+            <a:endParaRPr kumimoji="1" lang="en-US" altLang="zh-CN" sz="1600" kern="0" dirty="0">
               <a:latin typeface="微软雅黑" panose="020B0503020204020204" pitchFamily="34" charset="-122"/>
               <a:ea typeface="微软雅黑" panose="020B0503020204020204" pitchFamily="34" charset="-122"/>
               <a:cs typeface="+mn-ea"/>
@@ -16770,7 +16908,7 @@
               <a:buChar char="•"/>
             </a:pPr>
             <a:r>
-              <a:rPr kumimoji="1" lang="zh-CN" altLang="en-US" sz="1200" kern="0" dirty="0">
+              <a:rPr kumimoji="1" lang="zh-CN" altLang="en-US" sz="1600" kern="0" dirty="0">
                 <a:latin typeface="微软雅黑" panose="020B0503020204020204" pitchFamily="34" charset="-122"/>
                 <a:ea typeface="微软雅黑" panose="020B0503020204020204" pitchFamily="34" charset="-122"/>
                 <a:cs typeface="+mn-ea"/>
@@ -16779,7 +16917,7 @@
               <a:t>其他</a:t>
             </a:r>
             <a:r>
-              <a:rPr kumimoji="1" lang="en-US" altLang="zh-CN" sz="1200" kern="0" dirty="0">
+              <a:rPr kumimoji="1" lang="en-US" altLang="zh-CN" sz="1600" kern="0" dirty="0">
                 <a:latin typeface="微软雅黑" panose="020B0503020204020204" pitchFamily="34" charset="-122"/>
                 <a:ea typeface="微软雅黑" panose="020B0503020204020204" pitchFamily="34" charset="-122"/>
                 <a:cs typeface="+mn-ea"/>
@@ -16798,7 +16936,7 @@
               </a:spcBef>
             </a:pPr>
             <a:r>
-              <a:rPr kumimoji="1" lang="zh-CN" altLang="en-US" sz="1200" b="1" kern="0" dirty="0">
+              <a:rPr kumimoji="1" lang="zh-CN" altLang="en-US" sz="1600" b="1" kern="0" dirty="0">
                 <a:latin typeface="微软雅黑" panose="020B0503020204020204" pitchFamily="34" charset="-122"/>
                 <a:ea typeface="微软雅黑" panose="020B0503020204020204" pitchFamily="34" charset="-122"/>
                 <a:cs typeface="+mn-ea"/>
@@ -16806,7 +16944,7 @@
               </a:rPr>
               <a:t>模型框架</a:t>
             </a:r>
-            <a:endParaRPr kumimoji="1" lang="en-US" altLang="zh-CN" sz="1200" b="1" kern="0" dirty="0">
+            <a:endParaRPr kumimoji="1" lang="en-US" altLang="zh-CN" sz="1600" b="1" kern="0" dirty="0">
               <a:latin typeface="微软雅黑" panose="020B0503020204020204" pitchFamily="34" charset="-122"/>
               <a:ea typeface="微软雅黑" panose="020B0503020204020204" pitchFamily="34" charset="-122"/>
               <a:cs typeface="+mn-ea"/>
@@ -16825,7 +16963,7 @@
               <a:buChar char="•"/>
             </a:pPr>
             <a:r>
-              <a:rPr kumimoji="1" lang="en-US" altLang="zh-CN" sz="1200" kern="0" dirty="0" err="1">
+              <a:rPr kumimoji="1" lang="en-US" altLang="zh-CN" sz="1600" kern="0" dirty="0" err="1">
                 <a:latin typeface="微软雅黑" panose="020B0503020204020204" pitchFamily="34" charset="-122"/>
                 <a:ea typeface="微软雅黑" panose="020B0503020204020204" pitchFamily="34" charset="-122"/>
                 <a:cs typeface="+mn-ea"/>
@@ -16833,7 +16971,7 @@
               </a:rPr>
               <a:t>DeepFFM</a:t>
             </a:r>
-            <a:endParaRPr kumimoji="1" lang="en-US" altLang="zh-CN" sz="1200" kern="0" dirty="0">
+            <a:endParaRPr kumimoji="1" lang="en-US" altLang="zh-CN" sz="1600" kern="0" dirty="0">
               <a:latin typeface="微软雅黑" panose="020B0503020204020204" pitchFamily="34" charset="-122"/>
               <a:ea typeface="微软雅黑" panose="020B0503020204020204" pitchFamily="34" charset="-122"/>
               <a:cs typeface="+mn-ea"/>
@@ -16852,7 +16990,7 @@
               <a:buChar char="•"/>
             </a:pPr>
             <a:r>
-              <a:rPr kumimoji="1" lang="en-US" altLang="zh-CN" sz="1200" kern="0" dirty="0">
+              <a:rPr kumimoji="1" lang="en-US" altLang="zh-CN" sz="1600" kern="0" dirty="0">
                 <a:latin typeface="微软雅黑" panose="020B0503020204020204" pitchFamily="34" charset="-122"/>
                 <a:ea typeface="微软雅黑" panose="020B0503020204020204" pitchFamily="34" charset="-122"/>
                 <a:cs typeface="+mn-ea"/>
@@ -16861,7 +16999,7 @@
               <a:t>Neural</a:t>
             </a:r>
             <a:r>
-              <a:rPr kumimoji="1" lang="zh-CN" altLang="en-US" sz="1200" kern="0" dirty="0">
+              <a:rPr kumimoji="1" lang="zh-CN" altLang="en-US" sz="1600" kern="0" dirty="0">
                 <a:latin typeface="微软雅黑" panose="020B0503020204020204" pitchFamily="34" charset="-122"/>
                 <a:ea typeface="微软雅黑" panose="020B0503020204020204" pitchFamily="34" charset="-122"/>
                 <a:cs typeface="+mn-ea"/>
@@ -16870,7 +17008,7 @@
               <a:t> </a:t>
             </a:r>
             <a:r>
-              <a:rPr kumimoji="1" lang="en-US" altLang="zh-CN" sz="1200" kern="0" dirty="0">
+              <a:rPr kumimoji="1" lang="en-US" altLang="zh-CN" sz="1600" kern="0" dirty="0">
                 <a:latin typeface="微软雅黑" panose="020B0503020204020204" pitchFamily="34" charset="-122"/>
                 <a:ea typeface="微软雅黑" panose="020B0503020204020204" pitchFamily="34" charset="-122"/>
                 <a:cs typeface="+mn-ea"/>
@@ -16891,7 +17029,7 @@
               <a:buChar char="•"/>
             </a:pPr>
             <a:r>
-              <a:rPr kumimoji="1" lang="en-US" altLang="zh-CN" sz="1200" kern="0" dirty="0">
+              <a:rPr kumimoji="1" lang="en-US" altLang="zh-CN" sz="1600" kern="0" dirty="0">
                 <a:latin typeface="微软雅黑" panose="020B0503020204020204" pitchFamily="34" charset="-122"/>
                 <a:ea typeface="微软雅黑" panose="020B0503020204020204" pitchFamily="34" charset="-122"/>
                 <a:cs typeface="+mn-ea"/>
@@ -16899,7 +17037,7 @@
               </a:rPr>
               <a:t>…</a:t>
             </a:r>
-            <a:endParaRPr kumimoji="1" lang="zh-CN" altLang="en-US" sz="1200" kern="0" dirty="0">
+            <a:endParaRPr kumimoji="1" lang="zh-CN" altLang="en-US" sz="1600" kern="0" dirty="0">
               <a:latin typeface="微软雅黑" panose="020B0503020204020204" pitchFamily="34" charset="-122"/>
               <a:ea typeface="微软雅黑" panose="020B0503020204020204" pitchFamily="34" charset="-122"/>
               <a:cs typeface="+mn-ea"/>
@@ -21256,7 +21394,7 @@
         <p:spPr>
           <a:xfrm>
             <a:off x="983623" y="1135272"/>
-            <a:ext cx="1569660" cy="308995"/>
+            <a:ext cx="2031325" cy="381195"/>
           </a:xfrm>
           <a:prstGeom prst="rect">
             <a:avLst/>
@@ -21278,7 +21416,7 @@
               </a:spcBef>
             </a:pPr>
             <a:r>
-              <a:rPr kumimoji="1" lang="zh-CN" altLang="en-US" sz="1200" kern="0" dirty="0">
+              <a:rPr kumimoji="1" lang="zh-CN" altLang="en-US" sz="1600" kern="0" dirty="0">
                 <a:latin typeface="微软雅黑" panose="020B0503020204020204" pitchFamily="34" charset="-122"/>
                 <a:ea typeface="微软雅黑" panose="020B0503020204020204" pitchFamily="34" charset="-122"/>
                 <a:cs typeface="+mn-ea"/>
@@ -22836,7 +22974,7 @@
         <p:spPr>
           <a:xfrm>
             <a:off x="877503" y="959881"/>
-            <a:ext cx="7612073" cy="3719160"/>
+            <a:ext cx="7612073" cy="5311775"/>
           </a:xfrm>
           <a:prstGeom prst="rect">
             <a:avLst/>
@@ -22858,7 +22996,7 @@
               </a:spcBef>
             </a:pPr>
             <a:r>
-              <a:rPr kumimoji="1" lang="zh-CN" altLang="en-US" sz="1200" b="1" kern="0" dirty="0">
+              <a:rPr kumimoji="1" lang="zh-CN" altLang="en-US" sz="1600" b="1" kern="0" dirty="0">
                 <a:latin typeface="微软雅黑" panose="020B0503020204020204" pitchFamily="34" charset="-122"/>
                 <a:ea typeface="微软雅黑" panose="020B0503020204020204" pitchFamily="34" charset="-122"/>
                 <a:cs typeface="+mn-ea"/>
@@ -22866,7 +23004,7 @@
               </a:rPr>
               <a:t>数据编码</a:t>
             </a:r>
-            <a:endParaRPr kumimoji="1" lang="en-US" altLang="zh-CN" sz="1200" b="1" kern="0" dirty="0">
+            <a:endParaRPr kumimoji="1" lang="en-US" altLang="zh-CN" sz="1600" b="1" kern="0" dirty="0">
               <a:latin typeface="微软雅黑" panose="020B0503020204020204" pitchFamily="34" charset="-122"/>
               <a:ea typeface="微软雅黑" panose="020B0503020204020204" pitchFamily="34" charset="-122"/>
               <a:cs typeface="+mn-ea"/>
@@ -22885,7 +23023,7 @@
               <a:buChar char="•"/>
             </a:pPr>
             <a:r>
-              <a:rPr kumimoji="1" lang="en-US" altLang="zh-CN" sz="1200" b="1" kern="0" dirty="0">
+              <a:rPr kumimoji="1" lang="en-US" altLang="zh-CN" sz="1600" b="1" kern="0" dirty="0">
                 <a:latin typeface="微软雅黑" panose="020B0503020204020204" pitchFamily="34" charset="-122"/>
                 <a:ea typeface="微软雅黑" panose="020B0503020204020204" pitchFamily="34" charset="-122"/>
                 <a:cs typeface="+mn-ea"/>
@@ -22894,7 +23032,7 @@
               <a:t>One-hot</a:t>
             </a:r>
             <a:r>
-              <a:rPr kumimoji="1" lang="zh-CN" altLang="en-US" sz="1200" b="1" kern="0" dirty="0">
+              <a:rPr kumimoji="1" lang="zh-CN" altLang="en-US" sz="1600" b="1" kern="0" dirty="0">
                 <a:latin typeface="微软雅黑" panose="020B0503020204020204" pitchFamily="34" charset="-122"/>
                 <a:ea typeface="微软雅黑" panose="020B0503020204020204" pitchFamily="34" charset="-122"/>
                 <a:cs typeface="+mn-ea"/>
@@ -22902,7 +23040,7 @@
               </a:rPr>
               <a:t> 编码</a:t>
             </a:r>
-            <a:endParaRPr kumimoji="1" lang="en-US" altLang="zh-CN" sz="1200" b="1" kern="0" dirty="0">
+            <a:endParaRPr kumimoji="1" lang="en-US" altLang="zh-CN" sz="1600" b="1" kern="0" dirty="0">
               <a:latin typeface="微软雅黑" panose="020B0503020204020204" pitchFamily="34" charset="-122"/>
               <a:ea typeface="微软雅黑" panose="020B0503020204020204" pitchFamily="34" charset="-122"/>
               <a:cs typeface="+mn-ea"/>
@@ -22921,7 +23059,7 @@
               <a:buChar char="•"/>
             </a:pPr>
             <a:r>
-              <a:rPr kumimoji="1" lang="zh-CN" altLang="en-US" sz="1200" kern="0" dirty="0">
+              <a:rPr kumimoji="1" lang="zh-CN" altLang="en-US" sz="1600" kern="0" dirty="0">
                 <a:latin typeface="微软雅黑" panose="020B0503020204020204" pitchFamily="34" charset="-122"/>
                 <a:ea typeface="微软雅黑" panose="020B0503020204020204" pitchFamily="34" charset="-122"/>
                 <a:cs typeface="+mn-ea"/>
@@ -22930,7 +23068,7 @@
               <a:t>针对</a:t>
             </a:r>
             <a:r>
-              <a:rPr kumimoji="1" lang="en-US" altLang="zh-CN" sz="1200" kern="0" dirty="0" err="1">
+              <a:rPr kumimoji="1" lang="en-US" altLang="zh-CN" sz="1600" kern="0" dirty="0" err="1">
                 <a:latin typeface="微软雅黑" panose="020B0503020204020204" pitchFamily="34" charset="-122"/>
                 <a:ea typeface="微软雅黑" panose="020B0503020204020204" pitchFamily="34" charset="-122"/>
                 <a:cs typeface="+mn-ea"/>
@@ -22939,7 +23077,7 @@
               <a:t>user_feature</a:t>
             </a:r>
             <a:r>
-              <a:rPr kumimoji="1" lang="en-US" altLang="zh-CN" sz="1200" kern="0" dirty="0">
+              <a:rPr kumimoji="1" lang="en-US" altLang="zh-CN" sz="1600" kern="0" dirty="0">
                 <a:latin typeface="微软雅黑" panose="020B0503020204020204" pitchFamily="34" charset="-122"/>
                 <a:ea typeface="微软雅黑" panose="020B0503020204020204" pitchFamily="34" charset="-122"/>
                 <a:cs typeface="+mn-ea"/>
@@ -22948,7 +23086,7 @@
               <a:t> </a:t>
             </a:r>
             <a:r>
-              <a:rPr kumimoji="1" lang="zh-CN" altLang="en-US" sz="1200" kern="0" dirty="0">
+              <a:rPr kumimoji="1" lang="zh-CN" altLang="en-US" sz="1600" kern="0" dirty="0">
                 <a:latin typeface="微软雅黑" panose="020B0503020204020204" pitchFamily="34" charset="-122"/>
                 <a:ea typeface="微软雅黑" panose="020B0503020204020204" pitchFamily="34" charset="-122"/>
                 <a:cs typeface="+mn-ea"/>
@@ -22957,15 +23095,15 @@
               <a:t>中单个取值的离散特征，如：</a:t>
             </a:r>
             <a:r>
-              <a:rPr lang="en" altLang="zh-CN" sz="1200" dirty="0"/>
+              <a:rPr lang="en" altLang="zh-CN" sz="1600" dirty="0"/>
               <a:t>"age","</a:t>
             </a:r>
             <a:r>
-              <a:rPr lang="en" altLang="zh-CN" sz="1200" dirty="0" err="1"/>
+              <a:rPr lang="en" altLang="zh-CN" sz="1600" dirty="0" err="1"/>
               <a:t>consumptionAbility</a:t>
             </a:r>
             <a:r>
-              <a:rPr lang="en" altLang="zh-CN" sz="1200" dirty="0"/>
+              <a:rPr lang="en" altLang="zh-CN" sz="1600" dirty="0"/>
               <a:t>","education"</a:t>
             </a:r>
           </a:p>
@@ -22981,7 +23119,7 @@
               <a:buChar char="•"/>
             </a:pPr>
             <a:r>
-              <a:rPr kumimoji="1" lang="zh-CN" altLang="en-US" sz="1200" kern="0" dirty="0">
+              <a:rPr kumimoji="1" lang="zh-CN" altLang="en-US" sz="1600" kern="0" dirty="0">
                 <a:latin typeface="微软雅黑" panose="020B0503020204020204" pitchFamily="34" charset="-122"/>
                 <a:ea typeface="微软雅黑" panose="020B0503020204020204" pitchFamily="34" charset="-122"/>
                 <a:cs typeface="+mn-ea"/>
@@ -22990,7 +23128,7 @@
               <a:t>针对</a:t>
             </a:r>
             <a:r>
-              <a:rPr kumimoji="1" lang="en-US" altLang="zh-CN" sz="1200" kern="0" dirty="0" err="1">
+              <a:rPr kumimoji="1" lang="en-US" altLang="zh-CN" sz="1600" kern="0" dirty="0" err="1">
                 <a:latin typeface="微软雅黑" panose="020B0503020204020204" pitchFamily="34" charset="-122"/>
                 <a:ea typeface="微软雅黑" panose="020B0503020204020204" pitchFamily="34" charset="-122"/>
                 <a:cs typeface="+mn-ea"/>
@@ -22999,7 +23137,7 @@
               <a:t>ad_feature</a:t>
             </a:r>
             <a:r>
-              <a:rPr kumimoji="1" lang="en-US" altLang="zh-CN" sz="1200" kern="0" dirty="0">
+              <a:rPr kumimoji="1" lang="en-US" altLang="zh-CN" sz="1600" kern="0" dirty="0">
                 <a:latin typeface="微软雅黑" panose="020B0503020204020204" pitchFamily="34" charset="-122"/>
                 <a:ea typeface="微软雅黑" panose="020B0503020204020204" pitchFamily="34" charset="-122"/>
                 <a:cs typeface="+mn-ea"/>
@@ -23008,7 +23146,7 @@
               <a:t> </a:t>
             </a:r>
             <a:r>
-              <a:rPr kumimoji="1" lang="zh-CN" altLang="en-US" sz="1200" kern="0" dirty="0">
+              <a:rPr kumimoji="1" lang="zh-CN" altLang="en-US" sz="1600" kern="0" dirty="0">
                 <a:latin typeface="微软雅黑" panose="020B0503020204020204" pitchFamily="34" charset="-122"/>
                 <a:ea typeface="微软雅黑" panose="020B0503020204020204" pitchFamily="34" charset="-122"/>
                 <a:cs typeface="+mn-ea"/>
@@ -23017,34 +23155,34 @@
               <a:t>中单个取值的离散特征，如：</a:t>
             </a:r>
             <a:r>
-              <a:rPr lang="en" altLang="zh-CN" sz="1200" dirty="0"/>
+              <a:rPr lang="en" altLang="zh-CN" sz="1600" dirty="0"/>
               <a:t>"</a:t>
             </a:r>
             <a:r>
-              <a:rPr lang="en" altLang="zh-CN" sz="1200" dirty="0" err="1"/>
+              <a:rPr lang="en" altLang="zh-CN" sz="1600" dirty="0" err="1"/>
               <a:t>adCategoryId</a:t>
             </a:r>
             <a:r>
-              <a:rPr lang="en" altLang="zh-CN" sz="1200" dirty="0"/>
+              <a:rPr lang="en" altLang="zh-CN" sz="1600" dirty="0"/>
               <a:t>", "</a:t>
             </a:r>
             <a:r>
-              <a:rPr lang="en" altLang="zh-CN" sz="1200" dirty="0" err="1"/>
+              <a:rPr lang="en" altLang="zh-CN" sz="1600" dirty="0" err="1"/>
               <a:t>productId</a:t>
             </a:r>
             <a:r>
-              <a:rPr lang="en" altLang="zh-CN" sz="1200" dirty="0"/>
+              <a:rPr lang="en" altLang="zh-CN" sz="1600" dirty="0"/>
               <a:t>", "</a:t>
             </a:r>
             <a:r>
-              <a:rPr lang="en" altLang="zh-CN" sz="1200" dirty="0" err="1"/>
+              <a:rPr lang="en" altLang="zh-CN" sz="1600" dirty="0" err="1"/>
               <a:t>productType</a:t>
             </a:r>
             <a:r>
-              <a:rPr lang="en" altLang="zh-CN" sz="1200" dirty="0"/>
+              <a:rPr lang="en" altLang="zh-CN" sz="1600" dirty="0"/>
               <a:t>"</a:t>
             </a:r>
-            <a:endParaRPr kumimoji="1" lang="en-US" altLang="zh-CN" sz="1200" kern="0" dirty="0">
+            <a:endParaRPr kumimoji="1" lang="en-US" altLang="zh-CN" sz="1600" kern="0" dirty="0">
               <a:latin typeface="微软雅黑" panose="020B0503020204020204" pitchFamily="34" charset="-122"/>
               <a:ea typeface="微软雅黑" panose="020B0503020204020204" pitchFamily="34" charset="-122"/>
               <a:cs typeface="+mn-ea"/>
@@ -23063,7 +23201,7 @@
               <a:buChar char="•"/>
             </a:pPr>
             <a:r>
-              <a:rPr kumimoji="1" lang="zh-CN" altLang="en-US" sz="1200" b="1" kern="0" dirty="0">
+              <a:rPr kumimoji="1" lang="zh-CN" altLang="en-US" sz="1600" b="1" kern="0" dirty="0">
                 <a:latin typeface="微软雅黑" panose="020B0503020204020204" pitchFamily="34" charset="-122"/>
                 <a:ea typeface="微软雅黑" panose="020B0503020204020204" pitchFamily="34" charset="-122"/>
                 <a:cs typeface="+mn-ea"/>
@@ -23071,7 +23209,7 @@
               </a:rPr>
               <a:t>多值统计编码</a:t>
             </a:r>
-            <a:endParaRPr kumimoji="1" lang="en-US" altLang="zh-CN" sz="1200" b="1" kern="0" dirty="0">
+            <a:endParaRPr kumimoji="1" lang="en-US" altLang="zh-CN" sz="1600" b="1" kern="0" dirty="0">
               <a:latin typeface="微软雅黑" panose="020B0503020204020204" pitchFamily="34" charset="-122"/>
               <a:ea typeface="微软雅黑" panose="020B0503020204020204" pitchFamily="34" charset="-122"/>
               <a:cs typeface="+mn-ea"/>
@@ -23090,7 +23228,7 @@
               <a:buChar char="•"/>
             </a:pPr>
             <a:r>
-              <a:rPr kumimoji="1" lang="en-US" altLang="zh-CN" sz="1200" kern="0" dirty="0" err="1">
+              <a:rPr kumimoji="1" lang="en-US" altLang="zh-CN" sz="1600" kern="0" dirty="0" err="1">
                 <a:latin typeface="微软雅黑" panose="020B0503020204020204" pitchFamily="34" charset="-122"/>
                 <a:ea typeface="微软雅黑" panose="020B0503020204020204" pitchFamily="34" charset="-122"/>
                 <a:cs typeface="+mn-ea"/>
@@ -23099,7 +23237,7 @@
               <a:t>user_feature</a:t>
             </a:r>
             <a:r>
-              <a:rPr kumimoji="1" lang="en-US" altLang="zh-CN" sz="1200" kern="0" dirty="0">
+              <a:rPr kumimoji="1" lang="en-US" altLang="zh-CN" sz="1600" kern="0" dirty="0">
                 <a:latin typeface="微软雅黑" panose="020B0503020204020204" pitchFamily="34" charset="-122"/>
                 <a:ea typeface="微软雅黑" panose="020B0503020204020204" pitchFamily="34" charset="-122"/>
                 <a:cs typeface="+mn-ea"/>
@@ -23108,7 +23246,7 @@
               <a:t> </a:t>
             </a:r>
             <a:r>
-              <a:rPr kumimoji="1" lang="zh-CN" altLang="en-US" sz="1200" kern="0" dirty="0">
+              <a:rPr kumimoji="1" lang="zh-CN" altLang="en-US" sz="1600" kern="0" dirty="0">
                 <a:latin typeface="微软雅黑" panose="020B0503020204020204" pitchFamily="34" charset="-122"/>
                 <a:ea typeface="微软雅黑" panose="020B0503020204020204" pitchFamily="34" charset="-122"/>
                 <a:cs typeface="+mn-ea"/>
@@ -23117,15 +23255,15 @@
               <a:t>中的多取值的离散特征：如：</a:t>
             </a:r>
             <a:r>
-              <a:rPr lang="en" altLang="zh-CN" sz="1200" dirty="0"/>
+              <a:rPr lang="en" altLang="zh-CN" sz="1600" dirty="0"/>
               <a:t>"</a:t>
             </a:r>
             <a:r>
-              <a:rPr lang="en" altLang="zh-CN" sz="1200" dirty="0" err="1"/>
+              <a:rPr lang="en" altLang="zh-CN" sz="1600" dirty="0" err="1"/>
               <a:t>interest","topic","kw</a:t>
             </a:r>
             <a:r>
-              <a:rPr lang="en" altLang="zh-CN" sz="1200" dirty="0"/>
+              <a:rPr lang="en" altLang="zh-CN" sz="1600" dirty="0"/>
               <a:t>”</a:t>
             </a:r>
           </a:p>
@@ -23141,94 +23279,94 @@
               <a:buChar char="•"/>
             </a:pPr>
             <a:r>
-              <a:rPr lang="zh-CN" altLang="en" sz="1200" dirty="0"/>
+              <a:rPr lang="zh-CN" altLang="en" sz="1600" dirty="0"/>
               <a:t>举例</a:t>
             </a:r>
             <a:r>
-              <a:rPr lang="zh-CN" altLang="en-US" sz="1200" dirty="0"/>
+              <a:rPr lang="zh-CN" altLang="en-US" sz="1600" dirty="0"/>
               <a:t>：</a:t>
             </a:r>
             <a:r>
-              <a:rPr lang="en-US" altLang="zh-CN" sz="1200" dirty="0"/>
+              <a:rPr lang="en-US" altLang="zh-CN" sz="1600" dirty="0"/>
               <a:t>interest</a:t>
             </a:r>
             <a:r>
-              <a:rPr lang="zh-CN" altLang="en-US" sz="1200" dirty="0"/>
+              <a:rPr lang="zh-CN" altLang="en-US" sz="1600" dirty="0"/>
               <a:t>集合共有 </a:t>
             </a:r>
             <a:r>
-              <a:rPr lang="en-US" altLang="zh-CN" sz="1200" dirty="0"/>
+              <a:rPr lang="en-US" altLang="zh-CN" sz="1600" dirty="0"/>
               <a:t>I</a:t>
             </a:r>
             <a:r>
-              <a:rPr lang="en-US" altLang="zh-CN" sz="1200" baseline="-25000" dirty="0"/>
+              <a:rPr lang="en-US" altLang="zh-CN" sz="1600" baseline="-25000" dirty="0"/>
               <a:t>1</a:t>
             </a:r>
             <a:r>
-              <a:rPr lang="en-US" altLang="zh-CN" sz="1200" dirty="0"/>
+              <a:rPr lang="en-US" altLang="zh-CN" sz="1600" dirty="0"/>
               <a:t>,I</a:t>
             </a:r>
             <a:r>
-              <a:rPr lang="en-US" altLang="zh-CN" sz="1200" baseline="-25000" dirty="0"/>
+              <a:rPr lang="en-US" altLang="zh-CN" sz="1600" baseline="-25000" dirty="0"/>
               <a:t>2</a:t>
             </a:r>
             <a:r>
-              <a:rPr lang="en-US" altLang="zh-CN" sz="1200" dirty="0"/>
+              <a:rPr lang="en-US" altLang="zh-CN" sz="1600" dirty="0"/>
               <a:t>…I</a:t>
             </a:r>
             <a:r>
-              <a:rPr lang="en-US" altLang="zh-CN" sz="1200" baseline="-25000" dirty="0"/>
+              <a:rPr lang="en-US" altLang="zh-CN" sz="1600" baseline="-25000" dirty="0"/>
               <a:t>8</a:t>
             </a:r>
             <a:r>
-              <a:rPr lang="zh-CN" altLang="en-US" sz="1200" dirty="0"/>
+              <a:rPr lang="zh-CN" altLang="en-US" sz="1600" dirty="0"/>
               <a:t>这些不同的值，用户</a:t>
             </a:r>
             <a:r>
-              <a:rPr lang="en-US" altLang="zh-CN" sz="1200" dirty="0"/>
+              <a:rPr lang="en-US" altLang="zh-CN" sz="1600" dirty="0"/>
               <a:t>A interest</a:t>
             </a:r>
             <a:r>
-              <a:rPr lang="zh-CN" altLang="en-US" sz="1200" dirty="0"/>
+              <a:rPr lang="zh-CN" altLang="en-US" sz="1600" dirty="0"/>
               <a:t> 特征为：</a:t>
             </a:r>
             <a:r>
-              <a:rPr lang="en-US" altLang="zh-CN" sz="1200" dirty="0"/>
+              <a:rPr lang="en-US" altLang="zh-CN" sz="1600" dirty="0"/>
               <a:t>I</a:t>
             </a:r>
             <a:r>
-              <a:rPr lang="en-US" altLang="zh-CN" sz="1200" baseline="-25000" dirty="0"/>
+              <a:rPr lang="en-US" altLang="zh-CN" sz="1600" baseline="-25000" dirty="0"/>
               <a:t>1</a:t>
             </a:r>
             <a:r>
-              <a:rPr lang="en-US" altLang="zh-CN" sz="1200" dirty="0"/>
+              <a:rPr lang="en-US" altLang="zh-CN" sz="1600" dirty="0"/>
               <a:t>,I</a:t>
             </a:r>
             <a:r>
-              <a:rPr lang="en-US" altLang="zh-CN" sz="1200" baseline="-25000" dirty="0"/>
+              <a:rPr lang="en-US" altLang="zh-CN" sz="1600" baseline="-25000" dirty="0"/>
               <a:t>3</a:t>
             </a:r>
             <a:r>
-              <a:rPr lang="en-US" altLang="zh-CN" sz="1200" dirty="0"/>
+              <a:rPr lang="en-US" altLang="zh-CN" sz="1600" dirty="0"/>
               <a:t>,I</a:t>
             </a:r>
             <a:r>
-              <a:rPr lang="en-US" altLang="zh-CN" sz="1200" baseline="-25000" dirty="0"/>
+              <a:rPr lang="en-US" altLang="zh-CN" sz="1600" baseline="-25000" dirty="0"/>
               <a:t>6 </a:t>
             </a:r>
             <a:r>
-              <a:rPr lang="en-US" altLang="zh-CN" sz="1200" dirty="0"/>
+              <a:rPr lang="en-US" altLang="zh-CN" sz="1600" dirty="0"/>
               <a:t>, </a:t>
             </a:r>
             <a:r>
-              <a:rPr lang="zh-CN" altLang="en-US" sz="1200" dirty="0"/>
+              <a:rPr lang="zh-CN" altLang="en-US" sz="1600" dirty="0"/>
               <a:t>那么编码得到的向量为：</a:t>
             </a:r>
             <a:r>
-              <a:rPr lang="en-US" altLang="zh-CN" sz="1200" dirty="0"/>
+              <a:rPr lang="en-US" altLang="zh-CN" sz="1600" dirty="0"/>
               <a:t>[1,0,1,0,0,1,0,0]</a:t>
             </a:r>
-            <a:endParaRPr kumimoji="1" lang="en-US" altLang="zh-CN" sz="1200" b="1" kern="0" dirty="0">
+            <a:endParaRPr kumimoji="1" lang="en-US" altLang="zh-CN" sz="1600" b="1" kern="0" dirty="0">
               <a:latin typeface="微软雅黑" panose="020B0503020204020204" pitchFamily="34" charset="-122"/>
               <a:ea typeface="微软雅黑" panose="020B0503020204020204" pitchFamily="34" charset="-122"/>
               <a:cs typeface="+mn-ea"/>
@@ -23245,7 +23383,7 @@
               </a:spcBef>
             </a:pPr>
             <a:r>
-              <a:rPr kumimoji="1" lang="zh-CN" altLang="en-US" sz="1200" b="1" kern="0" dirty="0">
+              <a:rPr kumimoji="1" lang="zh-CN" altLang="en-US" sz="1600" b="1" kern="0" dirty="0">
                 <a:latin typeface="微软雅黑" panose="020B0503020204020204" pitchFamily="34" charset="-122"/>
                 <a:ea typeface="微软雅黑" panose="020B0503020204020204" pitchFamily="34" charset="-122"/>
                 <a:cs typeface="+mn-ea"/>
@@ -23253,7 +23391,7 @@
               </a:rPr>
               <a:t>稀疏处理</a:t>
             </a:r>
-            <a:endParaRPr kumimoji="1" lang="en-US" altLang="zh-CN" sz="1200" b="1" kern="0" dirty="0">
+            <a:endParaRPr kumimoji="1" lang="en-US" altLang="zh-CN" sz="1600" b="1" kern="0" dirty="0">
               <a:latin typeface="微软雅黑" panose="020B0503020204020204" pitchFamily="34" charset="-122"/>
               <a:ea typeface="微软雅黑" panose="020B0503020204020204" pitchFamily="34" charset="-122"/>
               <a:cs typeface="+mn-ea"/>
@@ -23272,7 +23410,7 @@
               <a:buChar char="•"/>
             </a:pPr>
             <a:r>
-              <a:rPr kumimoji="1" lang="zh-CN" altLang="en-US" sz="1200" kern="0" dirty="0">
+              <a:rPr kumimoji="1" lang="zh-CN" altLang="en-US" sz="1600" kern="0" dirty="0">
                 <a:latin typeface="微软雅黑" panose="020B0503020204020204" pitchFamily="34" charset="-122"/>
                 <a:ea typeface="微软雅黑" panose="020B0503020204020204" pitchFamily="34" charset="-122"/>
                 <a:cs typeface="+mn-ea"/>
@@ -23280,7 +23418,7 @@
               </a:rPr>
               <a:t>上述编码得到的特征矩阵，包含较多的零值，为稀疏矩阵</a:t>
             </a:r>
-            <a:endParaRPr kumimoji="1" lang="en-US" altLang="zh-CN" sz="1200" kern="0" dirty="0">
+            <a:endParaRPr kumimoji="1" lang="en-US" altLang="zh-CN" sz="1600" kern="0" dirty="0">
               <a:latin typeface="微软雅黑" panose="020B0503020204020204" pitchFamily="34" charset="-122"/>
               <a:ea typeface="微软雅黑" panose="020B0503020204020204" pitchFamily="34" charset="-122"/>
               <a:cs typeface="+mn-ea"/>
@@ -23299,7 +23437,7 @@
               <a:buChar char="•"/>
             </a:pPr>
             <a:r>
-              <a:rPr kumimoji="1" lang="zh-CN" altLang="en-US" sz="1200" kern="0" dirty="0">
+              <a:rPr kumimoji="1" lang="zh-CN" altLang="en-US" sz="1600" kern="0" dirty="0">
                 <a:latin typeface="微软雅黑" panose="020B0503020204020204" pitchFamily="34" charset="-122"/>
                 <a:ea typeface="微软雅黑" panose="020B0503020204020204" pitchFamily="34" charset="-122"/>
                 <a:cs typeface="+mn-ea"/>
@@ -23307,7 +23445,7 @@
               </a:rPr>
               <a:t>直接处理稀疏矩阵会有较高的空间复杂度与时间复杂度</a:t>
             </a:r>
-            <a:endParaRPr kumimoji="1" lang="en-US" altLang="zh-CN" sz="1200" kern="0" dirty="0">
+            <a:endParaRPr kumimoji="1" lang="en-US" altLang="zh-CN" sz="1600" kern="0" dirty="0">
               <a:latin typeface="微软雅黑" panose="020B0503020204020204" pitchFamily="34" charset="-122"/>
               <a:ea typeface="微软雅黑" panose="020B0503020204020204" pitchFamily="34" charset="-122"/>
               <a:cs typeface="+mn-ea"/>
@@ -23326,7 +23464,7 @@
               <a:buChar char="•"/>
             </a:pPr>
             <a:r>
-              <a:rPr kumimoji="1" lang="zh-CN" altLang="en-US" sz="1200" kern="0" dirty="0">
+              <a:rPr kumimoji="1" lang="zh-CN" altLang="en-US" sz="1600" kern="0" dirty="0">
                 <a:latin typeface="微软雅黑" panose="020B0503020204020204" pitchFamily="34" charset="-122"/>
                 <a:ea typeface="微软雅黑" panose="020B0503020204020204" pitchFamily="34" charset="-122"/>
                 <a:cs typeface="+mn-ea"/>
@@ -23334,7 +23472,7 @@
               </a:rPr>
               <a:t>特征矩阵压缩存储、稀疏化处理</a:t>
             </a:r>
-            <a:endParaRPr kumimoji="1" lang="en-US" altLang="zh-CN" sz="1200" kern="0" dirty="0">
+            <a:endParaRPr kumimoji="1" lang="en-US" altLang="zh-CN" sz="1600" kern="0" dirty="0">
               <a:latin typeface="微软雅黑" panose="020B0503020204020204" pitchFamily="34" charset="-122"/>
               <a:ea typeface="微软雅黑" panose="020B0503020204020204" pitchFamily="34" charset="-122"/>
               <a:cs typeface="+mn-ea"/>
@@ -23445,7 +23583,7 @@
         <p:spPr>
           <a:xfrm>
             <a:off x="877503" y="959881"/>
-            <a:ext cx="7343132" cy="2703497"/>
+            <a:ext cx="8753194" cy="3399072"/>
           </a:xfrm>
           <a:prstGeom prst="rect">
             <a:avLst/>
@@ -23467,7 +23605,7 @@
               </a:spcBef>
             </a:pPr>
             <a:r>
-              <a:rPr kumimoji="1" lang="en-US" altLang="zh-CN" sz="1200" b="1" kern="0" dirty="0" err="1">
+              <a:rPr kumimoji="1" lang="en-US" altLang="zh-CN" sz="1600" b="1" kern="0" dirty="0" err="1">
                 <a:latin typeface="微软雅黑" panose="020B0503020204020204" pitchFamily="34" charset="-122"/>
                 <a:ea typeface="微软雅黑" panose="020B0503020204020204" pitchFamily="34" charset="-122"/>
                 <a:cs typeface="+mn-ea"/>
@@ -23475,7 +23613,7 @@
               </a:rPr>
               <a:t>LightGBM</a:t>
             </a:r>
-            <a:endParaRPr kumimoji="1" lang="en-US" altLang="zh-CN" sz="1200" b="1" kern="0" dirty="0">
+            <a:endParaRPr kumimoji="1" lang="en-US" altLang="zh-CN" sz="1600" b="1" kern="0" dirty="0">
               <a:latin typeface="微软雅黑" panose="020B0503020204020204" pitchFamily="34" charset="-122"/>
               <a:ea typeface="微软雅黑" panose="020B0503020204020204" pitchFamily="34" charset="-122"/>
               <a:cs typeface="+mn-ea"/>
@@ -23494,14 +23632,14 @@
               <a:buChar char="•"/>
             </a:pPr>
             <a:r>
-              <a:rPr lang="en" altLang="zh-CN" sz="1200" dirty="0"/>
+              <a:rPr lang="en" altLang="zh-CN" sz="1600" dirty="0"/>
               <a:t>GBDT (Gradient Boosting Decision Tree)</a:t>
             </a:r>
             <a:r>
-              <a:rPr lang="zh-CN" altLang="en-US" sz="1200" dirty="0"/>
+              <a:rPr lang="zh-CN" altLang="en-US" sz="1600" dirty="0"/>
               <a:t>：利用弱分类器（决策树）迭代训练以得到最优模型，该模型具有训练效果好、不易过拟合等优点</a:t>
             </a:r>
-            <a:endParaRPr kumimoji="1" lang="en-US" altLang="zh-CN" sz="1200" b="1" kern="0" dirty="0">
+            <a:endParaRPr kumimoji="1" lang="en-US" altLang="zh-CN" sz="1600" b="1" kern="0" dirty="0">
               <a:latin typeface="微软雅黑" panose="020B0503020204020204" pitchFamily="34" charset="-122"/>
               <a:ea typeface="微软雅黑" panose="020B0503020204020204" pitchFamily="34" charset="-122"/>
               <a:cs typeface="+mn-ea"/>
@@ -23520,38 +23658,38 @@
               <a:buChar char="•"/>
             </a:pPr>
             <a:r>
-              <a:rPr lang="en" altLang="zh-CN" sz="1200" dirty="0" err="1"/>
+              <a:rPr lang="en" altLang="zh-CN" sz="1600" dirty="0" err="1"/>
               <a:t>LightGBM</a:t>
             </a:r>
             <a:r>
-              <a:rPr lang="en" altLang="zh-CN" sz="1200" dirty="0"/>
+              <a:rPr lang="en" altLang="zh-CN" sz="1600" dirty="0"/>
               <a:t> </a:t>
             </a:r>
             <a:r>
-              <a:rPr lang="zh-CN" altLang="en" sz="1200" dirty="0"/>
+              <a:rPr lang="zh-CN" altLang="en" sz="1600" dirty="0"/>
               <a:t>（</a:t>
             </a:r>
             <a:r>
-              <a:rPr lang="en" altLang="zh-CN" sz="1200" dirty="0"/>
+              <a:rPr lang="en" altLang="zh-CN" sz="1600" dirty="0"/>
               <a:t>Light Gradient Boosting Machine</a:t>
             </a:r>
             <a:r>
-              <a:rPr lang="zh-CN" altLang="en" sz="1200" dirty="0"/>
+              <a:rPr lang="zh-CN" altLang="en" sz="1600" dirty="0"/>
               <a:t>）</a:t>
             </a:r>
             <a:r>
-              <a:rPr lang="zh-CN" altLang="en-US" sz="1200" dirty="0"/>
+              <a:rPr lang="zh-CN" altLang="en-US" sz="1600" dirty="0"/>
               <a:t>是一个实现</a:t>
             </a:r>
             <a:r>
-              <a:rPr lang="en" altLang="zh-CN" sz="1200" dirty="0"/>
+              <a:rPr lang="en" altLang="zh-CN" sz="1600" dirty="0"/>
               <a:t>GBDT</a:t>
             </a:r>
             <a:r>
-              <a:rPr lang="zh-CN" altLang="en-US" sz="1200" dirty="0"/>
+              <a:rPr lang="zh-CN" altLang="en-US" sz="1600" dirty="0"/>
               <a:t>算法的框架，支持高效率的并行训练</a:t>
             </a:r>
-            <a:endParaRPr lang="en-US" altLang="zh-CN" sz="1200" dirty="0"/>
+            <a:endParaRPr lang="en-US" altLang="zh-CN" sz="1600" dirty="0"/>
           </a:p>
           <a:p>
             <a:pPr marL="628639" lvl="1" indent="-171450">
@@ -23565,7 +23703,7 @@
               <a:buChar char="•"/>
             </a:pPr>
             <a:r>
-              <a:rPr kumimoji="1" lang="en-US" altLang="zh-CN" sz="1200" kern="0" dirty="0" err="1">
+              <a:rPr kumimoji="1" lang="en-US" altLang="zh-CN" sz="1600" kern="0" dirty="0" err="1">
                 <a:latin typeface="微软雅黑" panose="020B0503020204020204" pitchFamily="34" charset="-122"/>
                 <a:ea typeface="微软雅黑" panose="020B0503020204020204" pitchFamily="34" charset="-122"/>
                 <a:cs typeface="+mn-ea"/>
@@ -23574,7 +23712,7 @@
               <a:t>LightGBM</a:t>
             </a:r>
             <a:r>
-              <a:rPr kumimoji="1" lang="zh-CN" altLang="en-US" sz="1200" kern="0" dirty="0">
+              <a:rPr kumimoji="1" lang="zh-CN" altLang="en-US" sz="1600" kern="0" dirty="0">
                 <a:latin typeface="微软雅黑" panose="020B0503020204020204" pitchFamily="34" charset="-122"/>
                 <a:ea typeface="微软雅黑" panose="020B0503020204020204" pitchFamily="34" charset="-122"/>
                 <a:cs typeface="+mn-ea"/>
@@ -23583,14 +23721,14 @@
               <a:t>使用</a:t>
             </a:r>
             <a:r>
-              <a:rPr lang="en" altLang="zh-CN" sz="1200" dirty="0"/>
+              <a:rPr lang="en" altLang="zh-CN" sz="1600" dirty="0"/>
               <a:t>Histogram</a:t>
             </a:r>
             <a:r>
-              <a:rPr lang="zh-CN" altLang="en-US" sz="1200" dirty="0"/>
+              <a:rPr lang="zh-CN" altLang="en-US" sz="1600" dirty="0"/>
               <a:t>算法进行数据切分并且支持类别特征，此外在并行计算上也做了一些改进</a:t>
             </a:r>
-            <a:endParaRPr lang="en-US" altLang="zh-CN" sz="1200" dirty="0"/>
+            <a:endParaRPr lang="en-US" altLang="zh-CN" sz="1600" dirty="0"/>
           </a:p>
           <a:p>
             <a:pPr marL="628639" lvl="1" indent="-171450" fontAlgn="base">
@@ -23601,16 +23739,16 @@
               <a:buChar char="•"/>
             </a:pPr>
             <a:r>
-              <a:rPr kumimoji="1" lang="zh-CN" altLang="en-US" sz="1200" kern="0" dirty="0">
+              <a:rPr kumimoji="1" lang="zh-CN" altLang="en-US" sz="1600" kern="0" dirty="0">
                 <a:latin typeface="微软雅黑" panose="020B0503020204020204" pitchFamily="34" charset="-122"/>
                 <a:ea typeface="微软雅黑" panose="020B0503020204020204" pitchFamily="34" charset="-122"/>
                 <a:cs typeface="+mn-ea"/>
                 <a:sym typeface="+mn-lt"/>
               </a:rPr>
-              <a:t>相比于其他继承学习框架（</a:t>
-            </a:r>
-            <a:r>
-              <a:rPr kumimoji="1" lang="en-US" altLang="zh-CN" sz="1200" kern="0" dirty="0" err="1">
+              <a:t>相比于其他集成学习框架（</a:t>
+            </a:r>
+            <a:r>
+              <a:rPr kumimoji="1" lang="en-US" altLang="zh-CN" sz="1600" kern="0" dirty="0" err="1">
                 <a:latin typeface="微软雅黑" panose="020B0503020204020204" pitchFamily="34" charset="-122"/>
                 <a:ea typeface="微软雅黑" panose="020B0503020204020204" pitchFamily="34" charset="-122"/>
                 <a:cs typeface="+mn-ea"/>
@@ -23619,7 +23757,7 @@
               <a:t>XGBoost</a:t>
             </a:r>
             <a:r>
-              <a:rPr kumimoji="1" lang="zh-CN" altLang="en-US" sz="1200" kern="0" dirty="0">
+              <a:rPr kumimoji="1" lang="zh-CN" altLang="en-US" sz="1600" kern="0" dirty="0">
                 <a:latin typeface="微软雅黑" panose="020B0503020204020204" pitchFamily="34" charset="-122"/>
                 <a:ea typeface="微软雅黑" panose="020B0503020204020204" pitchFamily="34" charset="-122"/>
                 <a:cs typeface="+mn-ea"/>
@@ -23628,7 +23766,7 @@
               <a:t>），</a:t>
             </a:r>
             <a:r>
-              <a:rPr kumimoji="1" lang="en-US" altLang="zh-CN" sz="1200" kern="0" dirty="0" err="1">
+              <a:rPr kumimoji="1" lang="en-US" altLang="zh-CN" sz="1600" kern="0" dirty="0" err="1">
                 <a:latin typeface="微软雅黑" panose="020B0503020204020204" pitchFamily="34" charset="-122"/>
                 <a:ea typeface="微软雅黑" panose="020B0503020204020204" pitchFamily="34" charset="-122"/>
                 <a:cs typeface="+mn-ea"/>
@@ -23637,7 +23775,7 @@
               <a:t>lightGBM</a:t>
             </a:r>
             <a:r>
-              <a:rPr kumimoji="1" lang="zh-CN" altLang="en-US" sz="1200" kern="0" dirty="0">
+              <a:rPr kumimoji="1" lang="zh-CN" altLang="en-US" sz="1600" kern="0" dirty="0">
                 <a:latin typeface="微软雅黑" panose="020B0503020204020204" pitchFamily="34" charset="-122"/>
                 <a:ea typeface="微软雅黑" panose="020B0503020204020204" pitchFamily="34" charset="-122"/>
                 <a:cs typeface="+mn-ea"/>
@@ -23646,7 +23784,7 @@
               <a:t>具有</a:t>
             </a:r>
             <a:r>
-              <a:rPr lang="zh-CN" altLang="en-US" sz="1200" dirty="0"/>
+              <a:rPr lang="zh-CN" altLang="en-US" sz="1600" dirty="0"/>
               <a:t>更快的训练速度、更低的内存消耗、更好的准确率</a:t>
             </a:r>
           </a:p>
@@ -25215,7 +25353,7 @@
         <p:spPr>
           <a:xfrm>
             <a:off x="877503" y="959881"/>
-            <a:ext cx="7334168" cy="3642216"/>
+            <a:ext cx="7912536" cy="4842544"/>
           </a:xfrm>
           <a:prstGeom prst="rect">
             <a:avLst/>
@@ -25237,7 +25375,7 @@
               </a:spcBef>
             </a:pPr>
             <a:r>
-              <a:rPr kumimoji="1" lang="zh-CN" altLang="en-US" sz="1200" b="1" kern="0" dirty="0">
+              <a:rPr kumimoji="1" lang="zh-CN" altLang="en-US" sz="1600" b="1" kern="0" dirty="0">
                 <a:latin typeface="微软雅黑" panose="020B0503020204020204" pitchFamily="34" charset="-122"/>
                 <a:ea typeface="微软雅黑" panose="020B0503020204020204" pitchFamily="34" charset="-122"/>
                 <a:cs typeface="+mn-ea"/>
@@ -25245,7 +25383,7 @@
               </a:rPr>
               <a:t>评价指标</a:t>
             </a:r>
-            <a:endParaRPr kumimoji="1" lang="en-US" altLang="zh-CN" sz="1200" b="1" kern="0" dirty="0">
+            <a:endParaRPr kumimoji="1" lang="en-US" altLang="zh-CN" sz="1600" b="1" kern="0" dirty="0">
               <a:latin typeface="微软雅黑" panose="020B0503020204020204" pitchFamily="34" charset="-122"/>
               <a:ea typeface="微软雅黑" panose="020B0503020204020204" pitchFamily="34" charset="-122"/>
               <a:cs typeface="+mn-ea"/>
@@ -25264,10 +25402,10 @@
               <a:buChar char="•"/>
             </a:pPr>
             <a:r>
-              <a:rPr lang="zh-CN" altLang="en-US" sz="1200" dirty="0"/>
+              <a:rPr lang="zh-CN" altLang="en-US" sz="1600" dirty="0"/>
               <a:t>对于测试集的用户，如果在广告投放上有相关的效果行为， 则认为是正例；如果不产生效果行为，则认为是负例</a:t>
             </a:r>
-            <a:endParaRPr lang="en-US" altLang="zh-CN" sz="1200" dirty="0"/>
+            <a:endParaRPr lang="en-US" altLang="zh-CN" sz="1600" dirty="0"/>
           </a:p>
           <a:p>
             <a:pPr marL="628639" lvl="1" indent="-171450">
@@ -25281,62 +25419,62 @@
               <a:buChar char="•"/>
             </a:pPr>
             <a:r>
-              <a:rPr lang="zh-CN" altLang="en-US" sz="1200" dirty="0"/>
+              <a:rPr lang="zh-CN" altLang="en-US" sz="1600" dirty="0"/>
               <a:t>为每个广告计算测试集中用户的得分，据此计算每个广告的</a:t>
             </a:r>
             <a:r>
-              <a:rPr lang="en" altLang="zh-CN" sz="1200" dirty="0"/>
+              <a:rPr lang="en" altLang="zh-CN" sz="1600" dirty="0"/>
               <a:t>AUC</a:t>
             </a:r>
             <a:r>
-              <a:rPr lang="zh-CN" altLang="en-US" sz="1200" dirty="0"/>
+              <a:rPr lang="zh-CN" altLang="en-US" sz="1600" dirty="0"/>
               <a:t>指标，</a:t>
             </a:r>
             <a:r>
-              <a:rPr lang="en" altLang="zh-CN" sz="1200" dirty="0" err="1"/>
+              <a:rPr lang="en" altLang="zh-CN" sz="1600" dirty="0" err="1"/>
               <a:t>AUC</a:t>
             </a:r>
             <a:r>
-              <a:rPr lang="en" altLang="zh-CN" sz="1200" baseline="-25000" dirty="0" err="1"/>
+              <a:rPr lang="en" altLang="zh-CN" sz="1600" baseline="-25000" dirty="0" err="1"/>
               <a:t>i</a:t>
             </a:r>
             <a:r>
-              <a:rPr lang="zh-CN" altLang="en-US" sz="1200" dirty="0"/>
+              <a:rPr lang="zh-CN" altLang="en-US" sz="1600" dirty="0"/>
               <a:t>表示第 </a:t>
             </a:r>
             <a:r>
-              <a:rPr lang="en" altLang="zh-CN" sz="1200" dirty="0"/>
+              <a:rPr lang="en" altLang="zh-CN" sz="1600" dirty="0"/>
               <a:t>I</a:t>
             </a:r>
             <a:r>
-              <a:rPr lang="zh-CN" altLang="en-US" sz="1200" dirty="0"/>
+              <a:rPr lang="zh-CN" altLang="en-US" sz="1600" dirty="0"/>
               <a:t> 个包的</a:t>
             </a:r>
             <a:r>
-              <a:rPr lang="en" altLang="zh-CN" sz="1200" dirty="0"/>
+              <a:rPr lang="en" altLang="zh-CN" sz="1600" dirty="0"/>
               <a:t>AUC</a:t>
             </a:r>
             <a:r>
-              <a:rPr lang="zh-CN" altLang="en-US" sz="1200" dirty="0"/>
+              <a:rPr lang="zh-CN" altLang="en-US" sz="1600" dirty="0"/>
               <a:t>值， 并以所有待评估的 </a:t>
             </a:r>
             <a:r>
-              <a:rPr lang="en" altLang="zh-CN" sz="1200" dirty="0"/>
+              <a:rPr lang="en" altLang="zh-CN" sz="1600" dirty="0"/>
               <a:t>m</a:t>
             </a:r>
             <a:r>
-              <a:rPr lang="zh-CN" altLang="en-US" sz="1200" dirty="0"/>
+              <a:rPr lang="zh-CN" altLang="en-US" sz="1600" dirty="0"/>
               <a:t> 个广告的平均</a:t>
             </a:r>
             <a:r>
-              <a:rPr lang="en" altLang="zh-CN" sz="1200" dirty="0"/>
+              <a:rPr lang="en" altLang="zh-CN" sz="1600" dirty="0"/>
               <a:t>AUC</a:t>
             </a:r>
             <a:r>
-              <a:rPr lang="zh-CN" altLang="en-US" sz="1200" dirty="0"/>
+              <a:rPr lang="zh-CN" altLang="en-US" sz="1600" dirty="0"/>
               <a:t>作为最终的评估指标：</a:t>
             </a:r>
-            <a:endParaRPr lang="en-US" altLang="zh-CN" sz="1200" dirty="0"/>
+            <a:endParaRPr lang="en-US" altLang="zh-CN" sz="1600" dirty="0"/>
           </a:p>
           <a:p>
             <a:pPr>
@@ -25347,7 +25485,7 @@
                 <a:spcPts val="600"/>
               </a:spcBef>
             </a:pPr>
-            <a:endParaRPr kumimoji="1" lang="en-US" altLang="zh-CN" sz="1200" b="1" kern="0" dirty="0">
+            <a:endParaRPr kumimoji="1" lang="en-US" altLang="zh-CN" sz="1600" b="1" kern="0" dirty="0">
               <a:latin typeface="微软雅黑" panose="020B0503020204020204" pitchFamily="34" charset="-122"/>
               <a:ea typeface="微软雅黑" panose="020B0503020204020204" pitchFamily="34" charset="-122"/>
               <a:cs typeface="+mn-ea"/>
@@ -25363,7 +25501,7 @@
                 <a:spcPts val="600"/>
               </a:spcBef>
             </a:pPr>
-            <a:endParaRPr kumimoji="1" lang="en-US" altLang="zh-CN" sz="1200" b="1" kern="0" dirty="0">
+            <a:endParaRPr kumimoji="1" lang="en-US" altLang="zh-CN" sz="1600" b="1" kern="0" dirty="0">
               <a:latin typeface="微软雅黑" panose="020B0503020204020204" pitchFamily="34" charset="-122"/>
               <a:ea typeface="微软雅黑" panose="020B0503020204020204" pitchFamily="34" charset="-122"/>
               <a:cs typeface="+mn-ea"/>
@@ -25379,7 +25517,7 @@
                 <a:spcPts val="600"/>
               </a:spcBef>
             </a:pPr>
-            <a:endParaRPr kumimoji="1" lang="en-US" altLang="zh-CN" sz="1200" b="1" kern="0" dirty="0">
+            <a:endParaRPr kumimoji="1" lang="en-US" altLang="zh-CN" sz="1600" b="1" kern="0" dirty="0">
               <a:latin typeface="微软雅黑" panose="020B0503020204020204" pitchFamily="34" charset="-122"/>
               <a:ea typeface="微软雅黑" panose="020B0503020204020204" pitchFamily="34" charset="-122"/>
               <a:cs typeface="+mn-ea"/>
@@ -25396,7 +25534,7 @@
               </a:spcBef>
             </a:pPr>
             <a:r>
-              <a:rPr kumimoji="1" lang="en-US" altLang="zh-CN" sz="1200" b="1" kern="0" dirty="0">
+              <a:rPr kumimoji="1" lang="en-US" altLang="zh-CN" sz="1600" b="1" kern="0" dirty="0">
                 <a:latin typeface="微软雅黑" panose="020B0503020204020204" pitchFamily="34" charset="-122"/>
                 <a:ea typeface="微软雅黑" panose="020B0503020204020204" pitchFamily="34" charset="-122"/>
                 <a:cs typeface="+mn-ea"/>
@@ -25405,7 +25543,7 @@
               <a:t>Baseline</a:t>
             </a:r>
             <a:r>
-              <a:rPr kumimoji="1" lang="zh-CN" altLang="en-US" sz="1200" b="1" kern="0" dirty="0">
+              <a:rPr kumimoji="1" lang="zh-CN" altLang="en-US" sz="1600" b="1" kern="0" dirty="0">
                 <a:latin typeface="微软雅黑" panose="020B0503020204020204" pitchFamily="34" charset="-122"/>
                 <a:ea typeface="微软雅黑" panose="020B0503020204020204" pitchFamily="34" charset="-122"/>
                 <a:cs typeface="+mn-ea"/>
@@ -25413,7 +25551,7 @@
               </a:rPr>
               <a:t>结果</a:t>
             </a:r>
-            <a:endParaRPr kumimoji="1" lang="en-US" altLang="zh-CN" sz="1200" b="1" kern="0" dirty="0">
+            <a:endParaRPr kumimoji="1" lang="en-US" altLang="zh-CN" sz="1600" b="1" kern="0" dirty="0">
               <a:latin typeface="微软雅黑" panose="020B0503020204020204" pitchFamily="34" charset="-122"/>
               <a:ea typeface="微软雅黑" panose="020B0503020204020204" pitchFamily="34" charset="-122"/>
               <a:cs typeface="+mn-ea"/>
@@ -25432,7 +25570,7 @@
               <a:buChar char="•"/>
             </a:pPr>
             <a:r>
-              <a:rPr kumimoji="1" lang="en-US" altLang="zh-CN" sz="1200" kern="0" dirty="0">
+              <a:rPr kumimoji="1" lang="en-US" altLang="zh-CN" sz="1600" kern="0" dirty="0">
                 <a:latin typeface="微软雅黑" panose="020B0503020204020204" pitchFamily="34" charset="-122"/>
                 <a:ea typeface="微软雅黑" panose="020B0503020204020204" pitchFamily="34" charset="-122"/>
                 <a:cs typeface="+mn-ea"/>
@@ -25441,7 +25579,7 @@
               <a:t>Baseline</a:t>
             </a:r>
             <a:r>
-              <a:rPr kumimoji="1" lang="zh-CN" altLang="en-US" sz="1200" kern="0" dirty="0">
+              <a:rPr kumimoji="1" lang="zh-CN" altLang="en-US" sz="1600" kern="0" dirty="0">
                 <a:latin typeface="微软雅黑" panose="020B0503020204020204" pitchFamily="34" charset="-122"/>
                 <a:ea typeface="微软雅黑" panose="020B0503020204020204" pitchFamily="34" charset="-122"/>
                 <a:cs typeface="+mn-ea"/>
@@ -25450,7 +25588,7 @@
               <a:t>模型最终得到的</a:t>
             </a:r>
             <a:r>
-              <a:rPr kumimoji="1" lang="en-US" altLang="zh-CN" sz="1200" kern="0" dirty="0">
+              <a:rPr kumimoji="1" lang="en-US" altLang="zh-CN" sz="1600" kern="0" dirty="0">
                 <a:latin typeface="微软雅黑" panose="020B0503020204020204" pitchFamily="34" charset="-122"/>
                 <a:ea typeface="微软雅黑" panose="020B0503020204020204" pitchFamily="34" charset="-122"/>
                 <a:cs typeface="+mn-ea"/>
@@ -25459,7 +25597,7 @@
               <a:t>AUC</a:t>
             </a:r>
             <a:r>
-              <a:rPr kumimoji="1" lang="zh-CN" altLang="en-US" sz="1200" kern="0" dirty="0">
+              <a:rPr kumimoji="1" lang="zh-CN" altLang="en-US" sz="1600" kern="0" dirty="0">
                 <a:latin typeface="微软雅黑" panose="020B0503020204020204" pitchFamily="34" charset="-122"/>
                 <a:ea typeface="微软雅黑" panose="020B0503020204020204" pitchFamily="34" charset="-122"/>
                 <a:cs typeface="+mn-ea"/>
@@ -25468,7 +25606,7 @@
               <a:t>平均值为</a:t>
             </a:r>
             <a:r>
-              <a:rPr kumimoji="1" lang="en-US" altLang="zh-CN" sz="1200" kern="0" dirty="0">
+              <a:rPr kumimoji="1" lang="en-US" altLang="zh-CN" sz="1600" kern="0" dirty="0">
                 <a:latin typeface="微软雅黑" panose="020B0503020204020204" pitchFamily="34" charset="-122"/>
                 <a:ea typeface="微软雅黑" panose="020B0503020204020204" pitchFamily="34" charset="-122"/>
                 <a:cs typeface="+mn-ea"/>
@@ -25489,7 +25627,7 @@
               <a:buChar char="•"/>
             </a:pPr>
             <a:r>
-              <a:rPr kumimoji="1" lang="zh-CN" altLang="en-US" sz="1200" kern="0" dirty="0">
+              <a:rPr kumimoji="1" lang="zh-CN" altLang="en-US" sz="1600" kern="0" dirty="0">
                 <a:latin typeface="微软雅黑" panose="020B0503020204020204" pitchFamily="34" charset="-122"/>
                 <a:ea typeface="微软雅黑" panose="020B0503020204020204" pitchFamily="34" charset="-122"/>
                 <a:cs typeface="+mn-ea"/>
@@ -25498,7 +25636,7 @@
               <a:t>迭代</a:t>
             </a:r>
             <a:r>
-              <a:rPr kumimoji="1" lang="en-US" altLang="zh-CN" sz="1200" kern="0" dirty="0">
+              <a:rPr kumimoji="1" lang="en-US" altLang="zh-CN" sz="1600" kern="0" dirty="0">
                 <a:latin typeface="微软雅黑" panose="020B0503020204020204" pitchFamily="34" charset="-122"/>
                 <a:ea typeface="微软雅黑" panose="020B0503020204020204" pitchFamily="34" charset="-122"/>
                 <a:cs typeface="+mn-ea"/>
@@ -25507,7 +25645,7 @@
               <a:t>1500</a:t>
             </a:r>
             <a:r>
-              <a:rPr kumimoji="1" lang="zh-CN" altLang="en-US" sz="1200" kern="0" dirty="0">
+              <a:rPr kumimoji="1" lang="zh-CN" altLang="en-US" sz="1600" kern="0" dirty="0">
                 <a:latin typeface="微软雅黑" panose="020B0503020204020204" pitchFamily="34" charset="-122"/>
                 <a:ea typeface="微软雅黑" panose="020B0503020204020204" pitchFamily="34" charset="-122"/>
                 <a:cs typeface="+mn-ea"/>
@@ -25516,7 +25654,7 @@
               <a:t>次，数据整体</a:t>
             </a:r>
             <a:r>
-              <a:rPr kumimoji="1" lang="en-US" altLang="zh-CN" sz="1200" kern="0" dirty="0">
+              <a:rPr kumimoji="1" lang="en-US" altLang="zh-CN" sz="1600" kern="0" dirty="0">
                 <a:latin typeface="微软雅黑" panose="020B0503020204020204" pitchFamily="34" charset="-122"/>
                 <a:ea typeface="微软雅黑" panose="020B0503020204020204" pitchFamily="34" charset="-122"/>
                 <a:cs typeface="+mn-ea"/>
@@ -25525,7 +25663,7 @@
               <a:t>AUC</a:t>
             </a:r>
             <a:r>
-              <a:rPr kumimoji="1" lang="zh-CN" altLang="en-US" sz="1200" kern="0" dirty="0">
+              <a:rPr kumimoji="1" lang="zh-CN" altLang="en-US" sz="1600" kern="0" dirty="0">
                 <a:latin typeface="微软雅黑" panose="020B0503020204020204" pitchFamily="34" charset="-122"/>
                 <a:ea typeface="微软雅黑" panose="020B0503020204020204" pitchFamily="34" charset="-122"/>
                 <a:cs typeface="+mn-ea"/>
@@ -25533,7 +25671,7 @@
               </a:rPr>
               <a:t>变化如右图所示：</a:t>
             </a:r>
-            <a:endParaRPr kumimoji="1" lang="en-US" altLang="zh-CN" sz="1200" kern="0" dirty="0">
+            <a:endParaRPr kumimoji="1" lang="en-US" altLang="zh-CN" sz="1600" kern="0" dirty="0">
               <a:latin typeface="微软雅黑" panose="020B0503020204020204" pitchFamily="34" charset="-122"/>
               <a:ea typeface="微软雅黑" panose="020B0503020204020204" pitchFamily="34" charset="-122"/>
               <a:cs typeface="+mn-ea"/>
@@ -25580,7 +25718,7 @@
         </p:blipFill>
         <p:spPr>
           <a:xfrm>
-            <a:off x="4075953" y="2384611"/>
+            <a:off x="3661445" y="3048000"/>
             <a:ext cx="1422400" cy="762000"/>
           </a:xfrm>
           <a:prstGeom prst="rect">
@@ -25610,7 +25748,7 @@
         </p:blipFill>
         <p:spPr>
           <a:xfrm>
-            <a:off x="5609865" y="2895762"/>
+            <a:off x="6550619" y="2895762"/>
             <a:ext cx="4550226" cy="3412670"/>
           </a:xfrm>
           <a:prstGeom prst="rect">
@@ -25632,7 +25770,7 @@
         </p:nvSpPr>
         <p:spPr>
           <a:xfrm>
-            <a:off x="6779942" y="6308432"/>
+            <a:off x="7909933" y="6308432"/>
             <a:ext cx="4282067" cy="308995"/>
           </a:xfrm>
           <a:prstGeom prst="rect">

</xml_diff>